<commit_message>
final ppt. last 3 slides are missing!!
</commit_message>
<xml_diff>
--- a/CIS 553.pptx
+++ b/CIS 553.pptx
@@ -205,7 +205,7 @@
             <a:fld id="{EE28FA45-A570-4675-9A80-6745B4AB3CF4}" type="datetimeFigureOut">
               <a:rPr lang="en-US" smtClean="0"/>
               <a:pPr/>
-              <a:t>4/26/2015</a:t>
+              <a:t>4/27/2015</a:t>
             </a:fld>
             <a:endParaRPr lang="en-US"/>
           </a:p>
@@ -652,7 +652,8 @@
           <a:p>
             <a:fld id="{86EABF9D-55D1-4ABC-B2B8-6909863E06C4}" type="datetime1">
               <a:rPr lang="en-US" smtClean="0"/>
-              <a:t>4/26/2015</a:t>
+              <a:pPr/>
+              <a:t>4/27/2015</a:t>
             </a:fld>
             <a:endParaRPr lang="en-US"/>
           </a:p>
@@ -822,7 +823,8 @@
           <a:p>
             <a:fld id="{1A34E7B5-1BBA-4BEC-91C2-388B53AE324C}" type="datetime1">
               <a:rPr lang="en-US" smtClean="0"/>
-              <a:t>4/26/2015</a:t>
+              <a:pPr/>
+              <a:t>4/27/2015</a:t>
             </a:fld>
             <a:endParaRPr lang="en-US"/>
           </a:p>
@@ -1002,7 +1004,8 @@
           <a:p>
             <a:fld id="{236EA7FC-0D7D-48E2-8C44-E4ACED517D50}" type="datetime1">
               <a:rPr lang="en-US" smtClean="0"/>
-              <a:t>4/26/2015</a:t>
+              <a:pPr/>
+              <a:t>4/27/2015</a:t>
             </a:fld>
             <a:endParaRPr lang="en-US"/>
           </a:p>
@@ -1172,7 +1175,8 @@
           <a:p>
             <a:fld id="{4477E786-A377-4885-B9EA-47AE21D4DA2B}" type="datetime1">
               <a:rPr lang="en-US" smtClean="0"/>
-              <a:t>4/26/2015</a:t>
+              <a:pPr/>
+              <a:t>4/27/2015</a:t>
             </a:fld>
             <a:endParaRPr lang="en-US"/>
           </a:p>
@@ -1418,7 +1422,8 @@
           <a:p>
             <a:fld id="{03A7A27F-6732-42FB-9B19-EB1AE655B10D}" type="datetime1">
               <a:rPr lang="en-US" smtClean="0"/>
-              <a:t>4/26/2015</a:t>
+              <a:pPr/>
+              <a:t>4/27/2015</a:t>
             </a:fld>
             <a:endParaRPr lang="en-US"/>
           </a:p>
@@ -1706,7 +1711,8 @@
           <a:p>
             <a:fld id="{BAF0424E-9369-4CB1-85B4-6278B6D3BB08}" type="datetime1">
               <a:rPr lang="en-US" smtClean="0"/>
-              <a:t>4/26/2015</a:t>
+              <a:pPr/>
+              <a:t>4/27/2015</a:t>
             </a:fld>
             <a:endParaRPr lang="en-US"/>
           </a:p>
@@ -2128,7 +2134,8 @@
           <a:p>
             <a:fld id="{4A88A493-7AFC-484F-8EA0-959EFB73071D}" type="datetime1">
               <a:rPr lang="en-US" smtClean="0"/>
-              <a:t>4/26/2015</a:t>
+              <a:pPr/>
+              <a:t>4/27/2015</a:t>
             </a:fld>
             <a:endParaRPr lang="en-US"/>
           </a:p>
@@ -2246,7 +2253,8 @@
           <a:p>
             <a:fld id="{03A41017-DB15-4B3C-8D81-8559CACFE97E}" type="datetime1">
               <a:rPr lang="en-US" smtClean="0"/>
-              <a:t>4/26/2015</a:t>
+              <a:pPr/>
+              <a:t>4/27/2015</a:t>
             </a:fld>
             <a:endParaRPr lang="en-US"/>
           </a:p>
@@ -2341,7 +2349,8 @@
           <a:p>
             <a:fld id="{47B9DDE3-CEB8-41BB-B704-0E1BE10E5C8C}" type="datetime1">
               <a:rPr lang="en-US" smtClean="0"/>
-              <a:t>4/26/2015</a:t>
+              <a:pPr/>
+              <a:t>4/27/2015</a:t>
             </a:fld>
             <a:endParaRPr lang="en-US"/>
           </a:p>
@@ -2618,7 +2627,8 @@
           <a:p>
             <a:fld id="{00111764-2798-4266-9A4D-05D182E3E276}" type="datetime1">
               <a:rPr lang="en-US" smtClean="0"/>
-              <a:t>4/26/2015</a:t>
+              <a:pPr/>
+              <a:t>4/27/2015</a:t>
             </a:fld>
             <a:endParaRPr lang="en-US"/>
           </a:p>
@@ -2871,7 +2881,8 @@
           <a:p>
             <a:fld id="{1E1CBCE8-42A1-4DA2-B9F0-D97137C26A27}" type="datetime1">
               <a:rPr lang="en-US" smtClean="0"/>
-              <a:t>4/26/2015</a:t>
+              <a:pPr/>
+              <a:t>4/27/2015</a:t>
             </a:fld>
             <a:endParaRPr lang="en-US"/>
           </a:p>
@@ -3084,7 +3095,8 @@
           <a:p>
             <a:fld id="{8B5BFA45-ECBA-40CD-8EA1-2AA7CB07BBB0}" type="datetime1">
               <a:rPr lang="en-US" smtClean="0"/>
-              <a:t>4/26/2015</a:t>
+              <a:pPr/>
+              <a:t>4/27/2015</a:t>
             </a:fld>
             <a:endParaRPr lang="en-US"/>
           </a:p>
@@ -3498,11 +3510,7 @@
             </a:br>
             <a:r>
               <a:rPr lang="en-US" dirty="0" smtClean="0"/>
-              <a:t>Group </a:t>
-            </a:r>
-            <a:r>
-              <a:rPr lang="en-US" dirty="0" smtClean="0"/>
-              <a:t>E</a:t>
+              <a:t>Group E</a:t>
             </a:r>
             <a:endParaRPr lang="en-US" dirty="0"/>
           </a:p>
@@ -3582,7 +3590,8 @@
           <a:p>
             <a:fld id="{ECFD9DA1-D5D0-45C3-9889-3F59E1322070}" type="datetime1">
               <a:rPr lang="en-US" smtClean="0"/>
-              <a:t>4/26/2015</a:t>
+              <a:pPr/>
+              <a:t>4/27/2015</a:t>
             </a:fld>
             <a:endParaRPr lang="en-US" dirty="0"/>
           </a:p>
@@ -3672,12 +3681,21 @@
         </p:nvSpPr>
         <p:spPr/>
         <p:txBody>
-          <a:bodyPr/>
+          <a:bodyPr>
+            <a:normAutofit fontScale="90000"/>
+          </a:bodyPr>
           <a:lstStyle/>
           <a:p>
             <a:r>
               <a:rPr lang="en-US" dirty="0" smtClean="0"/>
-              <a:t>Solution</a:t>
+              <a:t>Solution – </a:t>
+            </a:r>
+            <a:br>
+              <a:rPr lang="en-US" dirty="0" smtClean="0"/>
+            </a:br>
+            <a:r>
+              <a:rPr lang="en-US" sz="3100" dirty="0" smtClean="0"/>
+              <a:t>Ingress on pushback</a:t>
             </a:r>
             <a:endParaRPr lang="en-US" dirty="0"/>
           </a:p>
@@ -3723,6 +3741,7 @@
           <a:p>
             <a:fld id="{4477E786-A377-4885-B9EA-47AE21D4DA2B}" type="datetime1">
               <a:rPr lang="en-US" smtClean="0"/>
+              <a:pPr/>
               <a:t>4/27/2015</a:t>
             </a:fld>
             <a:endParaRPr lang="en-US"/>
@@ -3860,6 +3879,7 @@
           <a:p>
             <a:fld id="{4477E786-A377-4885-B9EA-47AE21D4DA2B}" type="datetime1">
               <a:rPr lang="en-US" smtClean="0"/>
+              <a:pPr/>
               <a:t>4/27/2015</a:t>
             </a:fld>
             <a:endParaRPr lang="en-US"/>
@@ -3997,6 +4017,7 @@
           <a:p>
             <a:fld id="{4477E786-A377-4885-B9EA-47AE21D4DA2B}" type="datetime1">
               <a:rPr lang="en-US" smtClean="0"/>
+              <a:pPr/>
               <a:t>4/27/2015</a:t>
             </a:fld>
             <a:endParaRPr lang="en-US"/>
@@ -4134,6 +4155,7 @@
           <a:p>
             <a:fld id="{4477E786-A377-4885-B9EA-47AE21D4DA2B}" type="datetime1">
               <a:rPr lang="en-US" smtClean="0"/>
+              <a:pPr/>
               <a:t>4/27/2015</a:t>
             </a:fld>
             <a:endParaRPr lang="en-US"/>
@@ -4306,7 +4328,6 @@
               <a:rPr lang="en-US" dirty="0" smtClean="0"/>
               <a:t> – The victim cannot service its intended users.</a:t>
             </a:r>
-            <a:endParaRPr lang="en-US" dirty="0" smtClean="0"/>
           </a:p>
         </p:txBody>
       </p:sp>
@@ -4327,7 +4348,8 @@
           <a:p>
             <a:fld id="{2852F238-DE6F-41DD-B4A1-639627BFED94}" type="datetime1">
               <a:rPr lang="en-US" smtClean="0"/>
-              <a:t>4/26/2015</a:t>
+              <a:pPr/>
+              <a:t>4/27/2015</a:t>
             </a:fld>
             <a:endParaRPr lang="en-US"/>
           </a:p>
@@ -4445,7 +4467,8 @@
           <a:p>
             <a:fld id="{4477E786-A377-4885-B9EA-47AE21D4DA2B}" type="datetime1">
               <a:rPr lang="en-US" smtClean="0"/>
-              <a:t>4/26/2015</a:t>
+              <a:pPr/>
+              <a:t>4/27/2015</a:t>
             </a:fld>
             <a:endParaRPr lang="en-US"/>
           </a:p>
@@ -4596,11 +4619,7 @@
           <a:p>
             <a:r>
               <a:rPr lang="en-US" dirty="0" smtClean="0"/>
-              <a:t>Detect an </a:t>
-            </a:r>
-            <a:r>
-              <a:rPr lang="en-US" dirty="0" smtClean="0"/>
-              <a:t>attack</a:t>
+              <a:t>Detect an attack</a:t>
             </a:r>
           </a:p>
           <a:p>
@@ -4618,11 +4637,7 @@
           <a:p>
             <a:r>
               <a:rPr lang="en-US" dirty="0" smtClean="0"/>
-              <a:t>If attacker in another domain – Send pushback request to the other domain</a:t>
-            </a:r>
-            <a:r>
-              <a:rPr lang="en-US" dirty="0" smtClean="0"/>
-              <a:t>.</a:t>
+              <a:t>If attacker in another domain – Send pushback request to the other domain.</a:t>
             </a:r>
           </a:p>
           <a:p>
@@ -4630,7 +4645,6 @@
               <a:rPr lang="en-US" dirty="0" smtClean="0"/>
               <a:t>Respond to a pushback request (if detected).</a:t>
             </a:r>
-            <a:endParaRPr lang="en-US" dirty="0" smtClean="0"/>
           </a:p>
         </p:txBody>
       </p:sp>
@@ -4651,7 +4665,8 @@
           <a:p>
             <a:fld id="{46298D32-FE18-4BCA-BDD4-353085F665D3}" type="datetime1">
               <a:rPr lang="en-US" smtClean="0"/>
-              <a:t>4/26/2015</a:t>
+              <a:pPr/>
+              <a:t>4/27/2015</a:t>
             </a:fld>
             <a:endParaRPr lang="en-US"/>
           </a:p>
@@ -4812,7 +4827,8 @@
           <a:p>
             <a:fld id="{687E2636-3B7C-4E31-9AF8-5289C40F57F7}" type="datetime1">
               <a:rPr lang="en-US" smtClean="0"/>
-              <a:t>4/26/2015</a:t>
+              <a:pPr/>
+              <a:t>4/27/2015</a:t>
             </a:fld>
             <a:endParaRPr lang="en-US"/>
           </a:p>
@@ -4975,6 +4991,7 @@
           <a:p>
             <a:fld id="{4477E786-A377-4885-B9EA-47AE21D4DA2B}" type="datetime1">
               <a:rPr lang="en-US" smtClean="0"/>
+              <a:pPr/>
               <a:t>4/27/2015</a:t>
             </a:fld>
             <a:endParaRPr lang="en-US"/>
@@ -5065,14 +5082,23 @@
         </p:nvSpPr>
         <p:spPr/>
         <p:txBody>
-          <a:bodyPr/>
+          <a:bodyPr>
+            <a:normAutofit fontScale="90000"/>
+          </a:bodyPr>
           <a:lstStyle/>
           <a:p>
             <a:r>
               <a:rPr lang="en-US" dirty="0" smtClean="0"/>
-              <a:t>Solution</a:t>
-            </a:r>
-            <a:endParaRPr lang="en-US" dirty="0"/>
+              <a:t>Solution – </a:t>
+            </a:r>
+            <a:br>
+              <a:rPr lang="en-US" dirty="0" smtClean="0"/>
+            </a:br>
+            <a:r>
+              <a:rPr lang="en-US" sz="3100" dirty="0" smtClean="0"/>
+              <a:t>Intra-domain ingress + inter-domain pushback</a:t>
+            </a:r>
+            <a:endParaRPr lang="en-US" sz="3100" dirty="0"/>
           </a:p>
         </p:txBody>
       </p:sp>
@@ -5116,6 +5142,7 @@
           <a:p>
             <a:fld id="{4477E786-A377-4885-B9EA-47AE21D4DA2B}" type="datetime1">
               <a:rPr lang="en-US" smtClean="0"/>
+              <a:pPr/>
               <a:t>4/27/2015</a:t>
             </a:fld>
             <a:endParaRPr lang="en-US"/>
@@ -5281,6 +5308,7 @@
           <a:p>
             <a:fld id="{4477E786-A377-4885-B9EA-47AE21D4DA2B}" type="datetime1">
               <a:rPr lang="en-US" smtClean="0"/>
+              <a:pPr/>
               <a:t>4/27/2015</a:t>
             </a:fld>
             <a:endParaRPr lang="en-US"/>
@@ -5371,12 +5399,21 @@
         </p:nvSpPr>
         <p:spPr/>
         <p:txBody>
-          <a:bodyPr/>
+          <a:bodyPr>
+            <a:normAutofit fontScale="90000"/>
+          </a:bodyPr>
           <a:lstStyle/>
           <a:p>
             <a:r>
               <a:rPr lang="en-US" dirty="0" smtClean="0"/>
-              <a:t>Solution</a:t>
+              <a:t>Solution – </a:t>
+            </a:r>
+            <a:br>
+              <a:rPr lang="en-US" dirty="0" smtClean="0"/>
+            </a:br>
+            <a:r>
+              <a:rPr lang="en-US" sz="3100" dirty="0" smtClean="0"/>
+              <a:t>Egress on pushback</a:t>
             </a:r>
             <a:endParaRPr lang="en-US" dirty="0"/>
           </a:p>
@@ -5422,6 +5459,7 @@
           <a:p>
             <a:fld id="{4477E786-A377-4885-B9EA-47AE21D4DA2B}" type="datetime1">
               <a:rPr lang="en-US" smtClean="0"/>
+              <a:pPr/>
               <a:t>4/27/2015</a:t>
             </a:fld>
             <a:endParaRPr lang="en-US"/>

</xml_diff>

<commit_message>
modified ppt with good colors :)
</commit_message>
<xml_diff>
--- a/CIS 553.pptx
+++ b/CIS 553.pptx
@@ -3720,7 +3720,7 @@
         <p:spPr>
           <a:xfrm>
             <a:off x="765005" y="1600200"/>
-            <a:ext cx="7613990" cy="4525963"/>
+            <a:ext cx="7613990" cy="4525962"/>
           </a:xfrm>
         </p:spPr>
       </p:pic>
@@ -4540,7 +4540,7 @@
         <p:spPr>
           <a:xfrm>
             <a:off x="561338" y="1600200"/>
-            <a:ext cx="8021323" cy="4525963"/>
+            <a:ext cx="8021322" cy="4525963"/>
           </a:xfrm>
         </p:spPr>
       </p:pic>
@@ -5121,7 +5121,7 @@
         <p:spPr>
           <a:xfrm>
             <a:off x="765005" y="1600200"/>
-            <a:ext cx="7613990" cy="4525963"/>
+            <a:ext cx="7613990" cy="4525962"/>
           </a:xfrm>
         </p:spPr>
       </p:pic>
@@ -5438,7 +5438,7 @@
         <p:spPr>
           <a:xfrm>
             <a:off x="765005" y="1600200"/>
-            <a:ext cx="7613990" cy="4525963"/>
+            <a:ext cx="7613990" cy="4525962"/>
           </a:xfrm>
         </p:spPr>
       </p:pic>

</xml_diff>

<commit_message>
with results and conclusion
</commit_message>
<xml_diff>
--- a/CIS 553.pptx
+++ b/CIS 553.pptx
@@ -5,7 +5,7 @@
     <p:sldMasterId id="2147483648" r:id="rId1"/>
   </p:sldMasterIdLst>
   <p:notesMasterIdLst>
-    <p:notesMasterId r:id="rId15"/>
+    <p:notesMasterId r:id="rId14"/>
   </p:notesMasterIdLst>
   <p:sldIdLst>
     <p:sldId id="256" r:id="rId2"/>
@@ -19,8 +19,7 @@
     <p:sldId id="267" r:id="rId10"/>
     <p:sldId id="268" r:id="rId11"/>
     <p:sldId id="264" r:id="rId12"/>
-    <p:sldId id="263" r:id="rId13"/>
-    <p:sldId id="265" r:id="rId14"/>
+    <p:sldId id="265" r:id="rId13"/>
   </p:sldIdLst>
   <p:sldSz cx="9144000" cy="6858000" type="screen4x3"/>
   <p:notesSz cx="6858000" cy="9144000"/>
@@ -119,6 +118,22 @@
       </a:defRPr>
     </a:lvl9pPr>
   </p:defaultTextStyle>
+  <p:extLst>
+    <p:ext uri="{EFAFB233-063F-42B5-8137-9DF3F51BA10A}">
+      <p15:sldGuideLst xmlns:p15="http://schemas.microsoft.com/office/powerpoint/2012/main" xmlns="">
+        <p15:guide id="1" orient="horz" pos="2160">
+          <p15:clr>
+            <a:srgbClr val="A4A3A4"/>
+          </p15:clr>
+        </p15:guide>
+        <p15:guide id="2" pos="2880">
+          <p15:clr>
+            <a:srgbClr val="A4A3A4"/>
+          </p15:clr>
+        </p15:guide>
+      </p15:sldGuideLst>
+    </p:ext>
+  </p:extLst>
 </p:presentation>
 </file>
 
@@ -171,7 +186,7 @@
             </a:lvl1pPr>
           </a:lstStyle>
           <a:p>
-            <a:endParaRPr lang="en-US"/>
+            <a:endParaRPr lang="en-US" dirty="0"/>
           </a:p>
         </p:txBody>
       </p:sp>
@@ -207,7 +222,7 @@
               <a:pPr/>
               <a:t>4/27/2015</a:t>
             </a:fld>
-            <a:endParaRPr lang="en-US"/>
+            <a:endParaRPr lang="en-US" dirty="0"/>
           </a:p>
         </p:txBody>
       </p:sp>
@@ -240,7 +255,7 @@
           <a:bodyPr vert="horz" lIns="91440" tIns="45720" rIns="91440" bIns="45720" rtlCol="0" anchor="ctr"/>
           <a:lstStyle/>
           <a:p>
-            <a:endParaRPr lang="en-US"/>
+            <a:endParaRPr lang="en-US" dirty="0"/>
           </a:p>
         </p:txBody>
       </p:sp>
@@ -333,7 +348,7 @@
             </a:lvl1pPr>
           </a:lstStyle>
           <a:p>
-            <a:endParaRPr lang="en-US"/>
+            <a:endParaRPr lang="en-US" dirty="0"/>
           </a:p>
         </p:txBody>
       </p:sp>
@@ -369,11 +384,16 @@
               <a:pPr/>
               <a:t>‹#›</a:t>
             </a:fld>
-            <a:endParaRPr lang="en-US"/>
+            <a:endParaRPr lang="en-US" dirty="0"/>
           </a:p>
         </p:txBody>
       </p:sp>
     </p:spTree>
+    <p:extLst>
+      <p:ext uri="{BB962C8B-B14F-4D97-AF65-F5344CB8AC3E}">
+        <p14:creationId xmlns:p14="http://schemas.microsoft.com/office/powerpoint/2010/main" xmlns="" val="4131704269"/>
+      </p:ext>
+    </p:extLst>
   </p:cSld>
   <p:clrMap bg1="lt1" tx1="dk1" bg2="lt2" tx2="dk2" accent1="accent1" accent2="accent2" accent3="accent3" accent4="accent4" accent5="accent5" accent6="accent6" hlink="hlink" folHlink="folHlink"/>
   <p:notesStyle>
@@ -655,7 +675,7 @@
               <a:pPr/>
               <a:t>4/27/2015</a:t>
             </a:fld>
-            <a:endParaRPr lang="en-US"/>
+            <a:endParaRPr lang="en-US" dirty="0"/>
           </a:p>
         </p:txBody>
       </p:sp>
@@ -675,10 +695,10 @@
           <a:lstStyle/>
           <a:p>
             <a:r>
-              <a:rPr lang="en-US" smtClean="0"/>
+              <a:rPr lang="en-US" dirty="0" smtClean="0"/>
               <a:t>Group E</a:t>
             </a:r>
-            <a:endParaRPr lang="en-US"/>
+            <a:endParaRPr lang="en-US" dirty="0"/>
           </a:p>
         </p:txBody>
       </p:sp>
@@ -702,7 +722,7 @@
               <a:pPr/>
               <a:t>‹#›</a:t>
             </a:fld>
-            <a:endParaRPr lang="en-US"/>
+            <a:endParaRPr lang="en-US" dirty="0"/>
           </a:p>
         </p:txBody>
       </p:sp>
@@ -826,7 +846,7 @@
               <a:pPr/>
               <a:t>4/27/2015</a:t>
             </a:fld>
-            <a:endParaRPr lang="en-US"/>
+            <a:endParaRPr lang="en-US" dirty="0"/>
           </a:p>
         </p:txBody>
       </p:sp>
@@ -846,10 +866,10 @@
           <a:lstStyle/>
           <a:p>
             <a:r>
-              <a:rPr lang="en-US" smtClean="0"/>
+              <a:rPr lang="en-US" dirty="0" smtClean="0"/>
               <a:t>Group E</a:t>
             </a:r>
-            <a:endParaRPr lang="en-US"/>
+            <a:endParaRPr lang="en-US" dirty="0"/>
           </a:p>
         </p:txBody>
       </p:sp>
@@ -873,7 +893,7 @@
               <a:pPr/>
               <a:t>‹#›</a:t>
             </a:fld>
-            <a:endParaRPr lang="en-US"/>
+            <a:endParaRPr lang="en-US" dirty="0"/>
           </a:p>
         </p:txBody>
       </p:sp>
@@ -1007,7 +1027,7 @@
               <a:pPr/>
               <a:t>4/27/2015</a:t>
             </a:fld>
-            <a:endParaRPr lang="en-US"/>
+            <a:endParaRPr lang="en-US" dirty="0"/>
           </a:p>
         </p:txBody>
       </p:sp>
@@ -1027,10 +1047,10 @@
           <a:lstStyle/>
           <a:p>
             <a:r>
-              <a:rPr lang="en-US" smtClean="0"/>
+              <a:rPr lang="en-US" dirty="0" smtClean="0"/>
               <a:t>Group E</a:t>
             </a:r>
-            <a:endParaRPr lang="en-US"/>
+            <a:endParaRPr lang="en-US" dirty="0"/>
           </a:p>
         </p:txBody>
       </p:sp>
@@ -1054,7 +1074,7 @@
               <a:pPr/>
               <a:t>‹#›</a:t>
             </a:fld>
-            <a:endParaRPr lang="en-US"/>
+            <a:endParaRPr lang="en-US" dirty="0"/>
           </a:p>
         </p:txBody>
       </p:sp>
@@ -1178,7 +1198,7 @@
               <a:pPr/>
               <a:t>4/27/2015</a:t>
             </a:fld>
-            <a:endParaRPr lang="en-US"/>
+            <a:endParaRPr lang="en-US" dirty="0"/>
           </a:p>
         </p:txBody>
       </p:sp>
@@ -1198,10 +1218,10 @@
           <a:lstStyle/>
           <a:p>
             <a:r>
-              <a:rPr lang="en-US" smtClean="0"/>
+              <a:rPr lang="en-US" dirty="0" smtClean="0"/>
               <a:t>Group E</a:t>
             </a:r>
-            <a:endParaRPr lang="en-US"/>
+            <a:endParaRPr lang="en-US" dirty="0"/>
           </a:p>
         </p:txBody>
       </p:sp>
@@ -1225,7 +1245,7 @@
               <a:pPr/>
               <a:t>‹#›</a:t>
             </a:fld>
-            <a:endParaRPr lang="en-US"/>
+            <a:endParaRPr lang="en-US" dirty="0"/>
           </a:p>
         </p:txBody>
       </p:sp>
@@ -1425,7 +1445,7 @@
               <a:pPr/>
               <a:t>4/27/2015</a:t>
             </a:fld>
-            <a:endParaRPr lang="en-US"/>
+            <a:endParaRPr lang="en-US" dirty="0"/>
           </a:p>
         </p:txBody>
       </p:sp>
@@ -1445,10 +1465,10 @@
           <a:lstStyle/>
           <a:p>
             <a:r>
-              <a:rPr lang="en-US" smtClean="0"/>
+              <a:rPr lang="en-US" dirty="0" smtClean="0"/>
               <a:t>Group E</a:t>
             </a:r>
-            <a:endParaRPr lang="en-US"/>
+            <a:endParaRPr lang="en-US" dirty="0"/>
           </a:p>
         </p:txBody>
       </p:sp>
@@ -1472,7 +1492,7 @@
               <a:pPr/>
               <a:t>‹#›</a:t>
             </a:fld>
-            <a:endParaRPr lang="en-US"/>
+            <a:endParaRPr lang="en-US" dirty="0"/>
           </a:p>
         </p:txBody>
       </p:sp>
@@ -1714,7 +1734,7 @@
               <a:pPr/>
               <a:t>4/27/2015</a:t>
             </a:fld>
-            <a:endParaRPr lang="en-US"/>
+            <a:endParaRPr lang="en-US" dirty="0"/>
           </a:p>
         </p:txBody>
       </p:sp>
@@ -1734,10 +1754,10 @@
           <a:lstStyle/>
           <a:p>
             <a:r>
-              <a:rPr lang="en-US" smtClean="0"/>
+              <a:rPr lang="en-US" dirty="0" smtClean="0"/>
               <a:t>Group E</a:t>
             </a:r>
-            <a:endParaRPr lang="en-US"/>
+            <a:endParaRPr lang="en-US" dirty="0"/>
           </a:p>
         </p:txBody>
       </p:sp>
@@ -1761,7 +1781,7 @@
               <a:pPr/>
               <a:t>‹#›</a:t>
             </a:fld>
-            <a:endParaRPr lang="en-US"/>
+            <a:endParaRPr lang="en-US" dirty="0"/>
           </a:p>
         </p:txBody>
       </p:sp>
@@ -2137,7 +2157,7 @@
               <a:pPr/>
               <a:t>4/27/2015</a:t>
             </a:fld>
-            <a:endParaRPr lang="en-US"/>
+            <a:endParaRPr lang="en-US" dirty="0"/>
           </a:p>
         </p:txBody>
       </p:sp>
@@ -2157,10 +2177,10 @@
           <a:lstStyle/>
           <a:p>
             <a:r>
-              <a:rPr lang="en-US" smtClean="0"/>
+              <a:rPr lang="en-US" dirty="0" smtClean="0"/>
               <a:t>Group E</a:t>
             </a:r>
-            <a:endParaRPr lang="en-US"/>
+            <a:endParaRPr lang="en-US" dirty="0"/>
           </a:p>
         </p:txBody>
       </p:sp>
@@ -2184,7 +2204,7 @@
               <a:pPr/>
               <a:t>‹#›</a:t>
             </a:fld>
-            <a:endParaRPr lang="en-US"/>
+            <a:endParaRPr lang="en-US" dirty="0"/>
           </a:p>
         </p:txBody>
       </p:sp>
@@ -2256,7 +2276,7 @@
               <a:pPr/>
               <a:t>4/27/2015</a:t>
             </a:fld>
-            <a:endParaRPr lang="en-US"/>
+            <a:endParaRPr lang="en-US" dirty="0"/>
           </a:p>
         </p:txBody>
       </p:sp>
@@ -2276,10 +2296,10 @@
           <a:lstStyle/>
           <a:p>
             <a:r>
-              <a:rPr lang="en-US" smtClean="0"/>
+              <a:rPr lang="en-US" dirty="0" smtClean="0"/>
               <a:t>Group E</a:t>
             </a:r>
-            <a:endParaRPr lang="en-US"/>
+            <a:endParaRPr lang="en-US" dirty="0"/>
           </a:p>
         </p:txBody>
       </p:sp>
@@ -2303,7 +2323,7 @@
               <a:pPr/>
               <a:t>‹#›</a:t>
             </a:fld>
-            <a:endParaRPr lang="en-US"/>
+            <a:endParaRPr lang="en-US" dirty="0"/>
           </a:p>
         </p:txBody>
       </p:sp>
@@ -2352,7 +2372,7 @@
               <a:pPr/>
               <a:t>4/27/2015</a:t>
             </a:fld>
-            <a:endParaRPr lang="en-US"/>
+            <a:endParaRPr lang="en-US" dirty="0"/>
           </a:p>
         </p:txBody>
       </p:sp>
@@ -2372,10 +2392,10 @@
           <a:lstStyle/>
           <a:p>
             <a:r>
-              <a:rPr lang="en-US" smtClean="0"/>
+              <a:rPr lang="en-US" dirty="0" smtClean="0"/>
               <a:t>Group E</a:t>
             </a:r>
-            <a:endParaRPr lang="en-US"/>
+            <a:endParaRPr lang="en-US" dirty="0"/>
           </a:p>
         </p:txBody>
       </p:sp>
@@ -2399,7 +2419,7 @@
               <a:pPr/>
               <a:t>‹#›</a:t>
             </a:fld>
-            <a:endParaRPr lang="en-US"/>
+            <a:endParaRPr lang="en-US" dirty="0"/>
           </a:p>
         </p:txBody>
       </p:sp>
@@ -2630,7 +2650,7 @@
               <a:pPr/>
               <a:t>4/27/2015</a:t>
             </a:fld>
-            <a:endParaRPr lang="en-US"/>
+            <a:endParaRPr lang="en-US" dirty="0"/>
           </a:p>
         </p:txBody>
       </p:sp>
@@ -2650,10 +2670,10 @@
           <a:lstStyle/>
           <a:p>
             <a:r>
-              <a:rPr lang="en-US" smtClean="0"/>
+              <a:rPr lang="en-US" dirty="0" smtClean="0"/>
               <a:t>Group E</a:t>
             </a:r>
-            <a:endParaRPr lang="en-US"/>
+            <a:endParaRPr lang="en-US" dirty="0"/>
           </a:p>
         </p:txBody>
       </p:sp>
@@ -2677,7 +2697,7 @@
               <a:pPr/>
               <a:t>‹#›</a:t>
             </a:fld>
-            <a:endParaRPr lang="en-US"/>
+            <a:endParaRPr lang="en-US" dirty="0"/>
           </a:p>
         </p:txBody>
       </p:sp>
@@ -2795,7 +2815,7 @@
             </a:lvl9pPr>
           </a:lstStyle>
           <a:p>
-            <a:endParaRPr lang="en-US"/>
+            <a:endParaRPr lang="en-US" dirty="0"/>
           </a:p>
         </p:txBody>
       </p:sp>
@@ -2884,7 +2904,7 @@
               <a:pPr/>
               <a:t>4/27/2015</a:t>
             </a:fld>
-            <a:endParaRPr lang="en-US"/>
+            <a:endParaRPr lang="en-US" dirty="0"/>
           </a:p>
         </p:txBody>
       </p:sp>
@@ -2904,10 +2924,10 @@
           <a:lstStyle/>
           <a:p>
             <a:r>
-              <a:rPr lang="en-US" smtClean="0"/>
+              <a:rPr lang="en-US" dirty="0" smtClean="0"/>
               <a:t>Group E</a:t>
             </a:r>
-            <a:endParaRPr lang="en-US"/>
+            <a:endParaRPr lang="en-US" dirty="0"/>
           </a:p>
         </p:txBody>
       </p:sp>
@@ -2931,7 +2951,7 @@
               <a:pPr/>
               <a:t>‹#›</a:t>
             </a:fld>
-            <a:endParaRPr lang="en-US"/>
+            <a:endParaRPr lang="en-US" dirty="0"/>
           </a:p>
         </p:txBody>
       </p:sp>
@@ -3098,7 +3118,7 @@
               <a:pPr/>
               <a:t>4/27/2015</a:t>
             </a:fld>
-            <a:endParaRPr lang="en-US"/>
+            <a:endParaRPr lang="en-US" dirty="0"/>
           </a:p>
         </p:txBody>
       </p:sp>
@@ -3136,10 +3156,10 @@
           </a:lstStyle>
           <a:p>
             <a:r>
-              <a:rPr lang="en-US" smtClean="0"/>
+              <a:rPr lang="en-US" dirty="0" smtClean="0"/>
               <a:t>Group E</a:t>
             </a:r>
-            <a:endParaRPr lang="en-US"/>
+            <a:endParaRPr lang="en-US" dirty="0"/>
           </a:p>
         </p:txBody>
       </p:sp>
@@ -3181,7 +3201,7 @@
               <a:pPr/>
               <a:t>‹#›</a:t>
             </a:fld>
-            <a:endParaRPr lang="en-US"/>
+            <a:endParaRPr lang="en-US" dirty="0"/>
           </a:p>
         </p:txBody>
       </p:sp>
@@ -3649,6 +3669,13 @@
   <p:clrMapOvr>
     <a:masterClrMapping/>
   </p:clrMapOvr>
+  <p:timing>
+    <p:tnLst>
+      <p:par>
+        <p:cTn id="1" dur="indefinite" restart="never" nodeType="tmRoot"/>
+      </p:par>
+    </p:tnLst>
+  </p:timing>
 </p:sld>
 </file>
 
@@ -3800,6 +3827,13 @@
   <p:clrMapOvr>
     <a:masterClrMapping/>
   </p:clrMapOvr>
+  <p:timing>
+    <p:tnLst>
+      <p:par>
+        <p:cTn id="1" dur="indefinite" restart="never" nodeType="tmRoot"/>
+      </p:par>
+    </p:tnLst>
+  </p:timing>
 </p:sld>
 </file>
 
@@ -3858,7 +3892,53 @@
           <a:bodyPr/>
           <a:lstStyle/>
           <a:p>
-            <a:endParaRPr lang="en-US"/>
+            <a:r>
+              <a:rPr lang="en-US" dirty="0" smtClean="0"/>
+              <a:t>Can detect an arbitrary number of concurrent (hping3) ping flood attacks on one or both of the protected hosts</a:t>
+            </a:r>
+          </a:p>
+          <a:p>
+            <a:r>
+              <a:rPr lang="en-US" dirty="0" smtClean="0"/>
+              <a:t>Response time 10s (5 * 2s query interval)</a:t>
+            </a:r>
+          </a:p>
+          <a:p>
+            <a:r>
+              <a:rPr lang="en-US" dirty="0" smtClean="0"/>
+              <a:t>Attack </a:t>
+            </a:r>
+            <a:r>
+              <a:rPr lang="en-US" dirty="0" smtClean="0"/>
+              <a:t>bandwidth </a:t>
+            </a:r>
+            <a:r>
+              <a:rPr lang="en-US" dirty="0" smtClean="0"/>
+              <a:t>mitigated to &lt; 60 </a:t>
+            </a:r>
+            <a:r>
+              <a:rPr lang="en-US" dirty="0" err="1" smtClean="0"/>
+              <a:t>kbit</a:t>
+            </a:r>
+            <a:r>
+              <a:rPr lang="en-US" dirty="0" smtClean="0"/>
+              <a:t>/s per attacker</a:t>
+            </a:r>
+          </a:p>
+          <a:p>
+            <a:r>
+              <a:rPr lang="en-US" dirty="0" smtClean="0"/>
+              <a:t>Automatic policy removal after traffic received from attacker &lt; 10 </a:t>
+            </a:r>
+            <a:r>
+              <a:rPr lang="en-US" dirty="0" err="1" smtClean="0"/>
+              <a:t>kbit</a:t>
+            </a:r>
+            <a:r>
+              <a:rPr lang="en-US" dirty="0" smtClean="0"/>
+              <a:t>/s</a:t>
+            </a:r>
+            <a:endParaRPr lang="en-US" dirty="0"/>
           </a:p>
         </p:txBody>
       </p:sp>
@@ -3938,6 +4018,13 @@
   <p:clrMapOvr>
     <a:masterClrMapping/>
   </p:clrMapOvr>
+  <p:timing>
+    <p:tnLst>
+      <p:par>
+        <p:cTn id="1" dur="indefinite" restart="never" nodeType="tmRoot"/>
+      </p:par>
+    </p:tnLst>
+  </p:timing>
 </p:sld>
 </file>
 
@@ -3975,7 +4062,7 @@
           <a:p>
             <a:r>
               <a:rPr lang="en-US" dirty="0" smtClean="0"/>
-              <a:t>Evaluation</a:t>
+              <a:t>Conclusion</a:t>
             </a:r>
             <a:endParaRPr lang="en-US" dirty="0"/>
           </a:p>
@@ -3996,7 +4083,41 @@
           <a:bodyPr/>
           <a:lstStyle/>
           <a:p>
-            <a:endParaRPr lang="en-US"/>
+            <a:r>
+              <a:rPr lang="en-US" dirty="0" smtClean="0"/>
+              <a:t>Given certain assumptions on the type of expected </a:t>
+            </a:r>
+            <a:r>
+              <a:rPr lang="en-US" dirty="0" err="1" smtClean="0"/>
+              <a:t>DDoS</a:t>
+            </a:r>
+            <a:r>
+              <a:rPr lang="en-US" dirty="0" smtClean="0"/>
+              <a:t> attack, SDN proves to be an easy to implement and effective way for mitigation</a:t>
+            </a:r>
+          </a:p>
+          <a:p>
+            <a:r>
+              <a:rPr lang="en-US" dirty="0" smtClean="0"/>
+              <a:t>But: realistic attacks (IP spoofing, fluctuating intensity on different links) provide </a:t>
+            </a:r>
+            <a:r>
+              <a:rPr lang="de-DE" dirty="0" smtClean="0"/>
+              <a:t>very </a:t>
+            </a:r>
+            <a:r>
+              <a:rPr lang="de-DE" dirty="0" smtClean="0"/>
+              <a:t>complex </a:t>
+            </a:r>
+            <a:r>
+              <a:rPr lang="de-DE" dirty="0" smtClean="0"/>
+              <a:t>challenges that </a:t>
+            </a:r>
+            <a:r>
+              <a:rPr lang="de-DE" smtClean="0"/>
+              <a:t>could surmount over our naive defence.</a:t>
+            </a:r>
+            <a:endParaRPr lang="en-US" dirty="0"/>
           </a:p>
         </p:txBody>
       </p:sp>
@@ -4020,7 +4141,7 @@
               <a:pPr/>
               <a:t>4/27/2015</a:t>
             </a:fld>
-            <a:endParaRPr lang="en-US"/>
+            <a:endParaRPr lang="en-US" dirty="0"/>
           </a:p>
         </p:txBody>
       </p:sp>
@@ -4040,10 +4161,10 @@
           <a:lstStyle/>
           <a:p>
             <a:r>
-              <a:rPr lang="en-US" smtClean="0"/>
+              <a:rPr lang="en-US" dirty="0" smtClean="0"/>
               <a:t>Group E</a:t>
             </a:r>
-            <a:endParaRPr lang="en-US"/>
+            <a:endParaRPr lang="en-US" dirty="0"/>
           </a:p>
         </p:txBody>
       </p:sp>
@@ -4067,7 +4188,7 @@
               <a:pPr/>
               <a:t>12</a:t>
             </a:fld>
-            <a:endParaRPr lang="en-US"/>
+            <a:endParaRPr lang="en-US" dirty="0"/>
           </a:p>
         </p:txBody>
       </p:sp>
@@ -4076,144 +4197,13 @@
   <p:clrMapOvr>
     <a:masterClrMapping/>
   </p:clrMapOvr>
-</p:sld>
-</file>
-
-<file path=ppt/slides/slide13.xml><?xml version="1.0" encoding="utf-8"?>
-<p:sld xmlns:a="http://schemas.openxmlformats.org/drawingml/2006/main" xmlns:r="http://schemas.openxmlformats.org/officeDocument/2006/relationships" xmlns:p="http://schemas.openxmlformats.org/presentationml/2006/main">
-  <p:cSld>
-    <p:spTree>
-      <p:nvGrpSpPr>
-        <p:cNvPr id="1" name=""/>
-        <p:cNvGrpSpPr/>
-        <p:nvPr/>
-      </p:nvGrpSpPr>
-      <p:grpSpPr>
-        <a:xfrm>
-          <a:off x="0" y="0"/>
-          <a:ext cx="0" cy="0"/>
-          <a:chOff x="0" y="0"/>
-          <a:chExt cx="0" cy="0"/>
-        </a:xfrm>
-      </p:grpSpPr>
-      <p:sp>
-        <p:nvSpPr>
-          <p:cNvPr id="2" name="Title 1"/>
-          <p:cNvSpPr>
-            <a:spLocks noGrp="1"/>
-          </p:cNvSpPr>
-          <p:nvPr>
-            <p:ph type="title"/>
-          </p:nvPr>
-        </p:nvSpPr>
-        <p:spPr/>
-        <p:txBody>
-          <a:bodyPr/>
-          <a:lstStyle/>
-          <a:p>
-            <a:r>
-              <a:rPr lang="en-US" dirty="0" smtClean="0"/>
-              <a:t>Conclusion</a:t>
-            </a:r>
-            <a:endParaRPr lang="en-US" dirty="0"/>
-          </a:p>
-        </p:txBody>
-      </p:sp>
-      <p:sp>
-        <p:nvSpPr>
-          <p:cNvPr id="3" name="Content Placeholder 2"/>
-          <p:cNvSpPr>
-            <a:spLocks noGrp="1"/>
-          </p:cNvSpPr>
-          <p:nvPr>
-            <p:ph idx="1"/>
-          </p:nvPr>
-        </p:nvSpPr>
-        <p:spPr/>
-        <p:txBody>
-          <a:bodyPr/>
-          <a:lstStyle/>
-          <a:p>
-            <a:endParaRPr lang="en-US"/>
-          </a:p>
-        </p:txBody>
-      </p:sp>
-      <p:sp>
-        <p:nvSpPr>
-          <p:cNvPr id="4" name="Date Placeholder 3"/>
-          <p:cNvSpPr>
-            <a:spLocks noGrp="1"/>
-          </p:cNvSpPr>
-          <p:nvPr>
-            <p:ph type="dt" sz="half" idx="10"/>
-          </p:nvPr>
-        </p:nvSpPr>
-        <p:spPr/>
-        <p:txBody>
-          <a:bodyPr/>
-          <a:lstStyle/>
-          <a:p>
-            <a:fld id="{4477E786-A377-4885-B9EA-47AE21D4DA2B}" type="datetime1">
-              <a:rPr lang="en-US" smtClean="0"/>
-              <a:pPr/>
-              <a:t>4/27/2015</a:t>
-            </a:fld>
-            <a:endParaRPr lang="en-US"/>
-          </a:p>
-        </p:txBody>
-      </p:sp>
-      <p:sp>
-        <p:nvSpPr>
-          <p:cNvPr id="5" name="Footer Placeholder 4"/>
-          <p:cNvSpPr>
-            <a:spLocks noGrp="1"/>
-          </p:cNvSpPr>
-          <p:nvPr>
-            <p:ph type="ftr" sz="quarter" idx="11"/>
-          </p:nvPr>
-        </p:nvSpPr>
-        <p:spPr/>
-        <p:txBody>
-          <a:bodyPr/>
-          <a:lstStyle/>
-          <a:p>
-            <a:r>
-              <a:rPr lang="en-US" smtClean="0"/>
-              <a:t>Group E</a:t>
-            </a:r>
-            <a:endParaRPr lang="en-US"/>
-          </a:p>
-        </p:txBody>
-      </p:sp>
-      <p:sp>
-        <p:nvSpPr>
-          <p:cNvPr id="6" name="Slide Number Placeholder 5"/>
-          <p:cNvSpPr>
-            <a:spLocks noGrp="1"/>
-          </p:cNvSpPr>
-          <p:nvPr>
-            <p:ph type="sldNum" sz="quarter" idx="12"/>
-          </p:nvPr>
-        </p:nvSpPr>
-        <p:spPr/>
-        <p:txBody>
-          <a:bodyPr/>
-          <a:lstStyle/>
-          <a:p>
-            <a:fld id="{BB90B8BA-37D4-4D21-8E9C-D13D5EBD542A}" type="slidenum">
-              <a:rPr lang="en-US" smtClean="0"/>
-              <a:pPr/>
-              <a:t>13</a:t>
-            </a:fld>
-            <a:endParaRPr lang="en-US"/>
-          </a:p>
-        </p:txBody>
-      </p:sp>
-    </p:spTree>
-  </p:cSld>
-  <p:clrMapOvr>
-    <a:masterClrMapping/>
-  </p:clrMapOvr>
+  <p:timing>
+    <p:tnLst>
+      <p:par>
+        <p:cTn id="1" dur="indefinite" restart="never" nodeType="tmRoot"/>
+      </p:par>
+    </p:tnLst>
+  </p:timing>
 </p:sld>
 </file>
 
@@ -4298,7 +4288,7 @@
             </a:r>
             <a:r>
               <a:rPr lang="en-US" dirty="0" smtClean="0"/>
-              <a:t> – Multiple attackers target a single victim node.</a:t>
+              <a:t> – Multiple attackers target a single victim node</a:t>
             </a:r>
           </a:p>
           <a:p>
@@ -4316,7 +4306,7 @@
             </a:r>
             <a:r>
               <a:rPr lang="en-US" dirty="0" smtClean="0"/>
-              <a:t>(ping flood) and keep its resources tied.</a:t>
+              <a:t>(ping flood) and keep its resources tied</a:t>
             </a:r>
           </a:p>
           <a:p>
@@ -4326,7 +4316,7 @@
             </a:r>
             <a:r>
               <a:rPr lang="en-US" dirty="0" smtClean="0"/>
-              <a:t> – The victim cannot service its intended users.</a:t>
+              <a:t> – The victim cannot service its intended users</a:t>
             </a:r>
           </a:p>
         </p:txBody>
@@ -4407,6 +4397,13 @@
   <p:clrMapOvr>
     <a:masterClrMapping/>
   </p:clrMapOvr>
+  <p:timing>
+    <p:tnLst>
+      <p:par>
+        <p:cTn id="1" dur="indefinite" restart="never" nodeType="tmRoot"/>
+      </p:par>
+    </p:tnLst>
+  </p:timing>
 </p:sld>
 </file>
 
@@ -4549,6 +4546,13 @@
   <p:clrMapOvr>
     <a:masterClrMapping/>
   </p:clrMapOvr>
+  <p:timing>
+    <p:tnLst>
+      <p:par>
+        <p:cTn id="1" dur="indefinite" restart="never" nodeType="tmRoot"/>
+      </p:par>
+    </p:tnLst>
+  </p:timing>
 </p:sld>
 </file>
 
@@ -4631,19 +4635,19 @@
           <a:p>
             <a:r>
               <a:rPr lang="en-US" dirty="0" smtClean="0"/>
-              <a:t>If attacker in same domain – Apply Ingress on the switch-attacker link.</a:t>
-            </a:r>
-          </a:p>
-          <a:p>
-            <a:r>
-              <a:rPr lang="en-US" dirty="0" smtClean="0"/>
-              <a:t>If attacker in another domain – Send pushback request to the other domain.</a:t>
-            </a:r>
-          </a:p>
-          <a:p>
-            <a:r>
-              <a:rPr lang="en-US" dirty="0" smtClean="0"/>
-              <a:t>Respond to a pushback request (if detected).</a:t>
+              <a:t>Attacker in same domain –&gt; Apply Ingress on the port the attacker is connected</a:t>
+            </a:r>
+          </a:p>
+          <a:p>
+            <a:r>
+              <a:rPr lang="en-US" dirty="0" smtClean="0"/>
+              <a:t>Attacker in another domain –&gt; Send pushback request to the other domain</a:t>
+            </a:r>
+          </a:p>
+          <a:p>
+            <a:r>
+              <a:rPr lang="en-US" dirty="0" smtClean="0"/>
+              <a:t>Respond to a pushback request (if detected)</a:t>
             </a:r>
           </a:p>
         </p:txBody>
@@ -4724,6 +4728,13 @@
   <p:clrMapOvr>
     <a:masterClrMapping/>
   </p:clrMapOvr>
+  <p:timing>
+    <p:tnLst>
+      <p:par>
+        <p:cTn id="1" dur="indefinite" restart="never" nodeType="tmRoot"/>
+      </p:par>
+    </p:tnLst>
+  </p:timing>
 </p:sld>
 </file>
 
@@ -4790,7 +4801,7 @@
           <a:p>
             <a:r>
               <a:rPr lang="en-US" dirty="0" smtClean="0"/>
-              <a:t>Controller A protects hosts AAh1 and AAh2 by monitoring flows on all 3 switches under its domain for high bandwidth (5 Mbps).</a:t>
+              <a:t>Controller A protects hosts AAh1 and AAh2 by monitoring flows on all 3 switches in its domain for high bandwidth (5 Mbps)</a:t>
             </a:r>
           </a:p>
           <a:p>
@@ -4802,7 +4813,7 @@
           <a:p>
             <a:r>
               <a:rPr lang="en-US" dirty="0" smtClean="0"/>
-              <a:t>Check each host to check if it is sending data to the victim and its data rate is above a threshold (1 Mbps).</a:t>
+              <a:t>Check each host to check if it is sending data to the victim and its data rate is above a threshold (1 Mbps)</a:t>
             </a:r>
           </a:p>
           <a:p>
@@ -4886,11 +4897,18 @@
   <p:clrMapOvr>
     <a:masterClrMapping/>
   </p:clrMapOvr>
+  <p:timing>
+    <p:tnLst>
+      <p:par>
+        <p:cTn id="1" dur="indefinite" restart="never" nodeType="tmRoot"/>
+      </p:par>
+    </p:tnLst>
+  </p:timing>
 </p:sld>
 </file>
 
 <file path=ppt/slides/slide6.xml><?xml version="1.0" encoding="utf-8"?>
-<p:sld xmlns:a="http://schemas.openxmlformats.org/drawingml/2006/main" xmlns:r="http://schemas.openxmlformats.org/officeDocument/2006/relationships" xmlns:p="http://schemas.openxmlformats.org/presentationml/2006/main">
+<p:sld xmlns:a="http://schemas.openxmlformats.org/drawingml/2006/main" xmlns:r="http://schemas.openxmlformats.org/officeDocument/2006/relationships" xmlns:p="http://schemas.openxmlformats.org/presentationml/2006/main" show="0">
   <p:cSld>
     <p:spTree>
       <p:nvGrpSpPr>
@@ -4956,7 +4974,7 @@
           <a:p>
             <a:r>
               <a:rPr lang="en-US" dirty="0" smtClean="0"/>
-              <a:t>Apply ingress policy on the link connecting the attacker to the domain.</a:t>
+              <a:t>Apply ingress policy on the link connecting the attacker to the domain</a:t>
             </a:r>
           </a:p>
           <a:p>
@@ -4968,7 +4986,7 @@
           <a:p>
             <a:r>
               <a:rPr lang="en-US" dirty="0" smtClean="0"/>
-              <a:t>Send a push back request to the other controller.</a:t>
+              <a:t>Send a push back request to the other controller</a:t>
             </a:r>
             <a:endParaRPr lang="en-US" dirty="0"/>
           </a:p>
@@ -5050,6 +5068,21 @@
   <p:clrMapOvr>
     <a:masterClrMapping/>
   </p:clrMapOvr>
+  <mc:AlternateContent xmlns:mc="http://schemas.openxmlformats.org/markup-compatibility/2006">
+    <mc:Choice xmlns:p14="http://schemas.microsoft.com/office/powerpoint/2010/main" xmlns="" Requires="p14">
+      <p:transition spd="slow" p14:dur="2000"/>
+    </mc:Choice>
+    <mc:Fallback>
+      <p:transition spd="slow"/>
+    </mc:Fallback>
+  </mc:AlternateContent>
+  <p:timing>
+    <p:tnLst>
+      <p:par>
+        <p:cTn id="1" dur="indefinite" restart="never" nodeType="tmRoot"/>
+      </p:par>
+    </p:tnLst>
+  </p:timing>
 </p:sld>
 </file>
 
@@ -5201,11 +5234,26 @@
   <p:clrMapOvr>
     <a:masterClrMapping/>
   </p:clrMapOvr>
+  <mc:AlternateContent xmlns:mc="http://schemas.openxmlformats.org/markup-compatibility/2006">
+    <mc:Choice xmlns:p14="http://schemas.microsoft.com/office/powerpoint/2010/main" xmlns="" Requires="p14">
+      <p:transition spd="slow" p14:dur="2000"/>
+    </mc:Choice>
+    <mc:Fallback>
+      <p:transition spd="slow"/>
+    </mc:Fallback>
+  </mc:AlternateContent>
+  <p:timing>
+    <p:tnLst>
+      <p:par>
+        <p:cTn id="1" dur="indefinite" restart="never" nodeType="tmRoot"/>
+      </p:par>
+    </p:tnLst>
+  </p:timing>
 </p:sld>
 </file>
 
 <file path=ppt/slides/slide8.xml><?xml version="1.0" encoding="utf-8"?>
-<p:sld xmlns:a="http://schemas.openxmlformats.org/drawingml/2006/main" xmlns:r="http://schemas.openxmlformats.org/officeDocument/2006/relationships" xmlns:p="http://schemas.openxmlformats.org/presentationml/2006/main">
+<p:sld xmlns:a="http://schemas.openxmlformats.org/drawingml/2006/main" xmlns:r="http://schemas.openxmlformats.org/officeDocument/2006/relationships" xmlns:p="http://schemas.openxmlformats.org/presentationml/2006/main" show="0">
   <p:cSld>
     <p:spTree>
       <p:nvGrpSpPr>
@@ -5267,13 +5315,13 @@
           <a:p>
             <a:r>
               <a:rPr lang="en-US" dirty="0" smtClean="0"/>
-              <a:t>Indentify the attacker.</a:t>
-            </a:r>
-          </a:p>
-          <a:p>
-            <a:r>
-              <a:rPr lang="en-US" dirty="0" smtClean="0"/>
-              <a:t>Place an egress on the switch connecting attacker to the domain.</a:t>
+              <a:t>Identify the attacker</a:t>
+            </a:r>
+          </a:p>
+          <a:p>
+            <a:r>
+              <a:rPr lang="en-US" dirty="0" smtClean="0"/>
+              <a:t>Place an egress on the switch connecting attacker to the domain</a:t>
             </a:r>
           </a:p>
           <a:p>
@@ -5285,7 +5333,7 @@
           <a:p>
             <a:r>
               <a:rPr lang="en-US" dirty="0" smtClean="0"/>
-              <a:t>Place an ingress at the link connecting the attacker to the domain and remove the egress policy.</a:t>
+              <a:t>Place an ingress at the link connecting the attacker to the domain and remove the egress policy</a:t>
             </a:r>
             <a:endParaRPr lang="en-US" dirty="0"/>
           </a:p>
@@ -5367,6 +5415,21 @@
   <p:clrMapOvr>
     <a:masterClrMapping/>
   </p:clrMapOvr>
+  <mc:AlternateContent xmlns:mc="http://schemas.openxmlformats.org/markup-compatibility/2006">
+    <mc:Choice xmlns:p14="http://schemas.microsoft.com/office/powerpoint/2010/main" xmlns="" Requires="p14">
+      <p:transition spd="slow" p14:dur="2000"/>
+    </mc:Choice>
+    <mc:Fallback>
+      <p:transition spd="slow"/>
+    </mc:Fallback>
+  </mc:AlternateContent>
+  <p:timing>
+    <p:tnLst>
+      <p:par>
+        <p:cTn id="1" dur="indefinite" restart="never" nodeType="tmRoot"/>
+      </p:par>
+    </p:tnLst>
+  </p:timing>
 </p:sld>
 </file>
 
@@ -5518,6 +5581,13 @@
   <p:clrMapOvr>
     <a:masterClrMapping/>
   </p:clrMapOvr>
+  <p:timing>
+    <p:tnLst>
+      <p:par>
+        <p:cTn id="1" dur="indefinite" restart="never" nodeType="tmRoot"/>
+      </p:par>
+    </p:tnLst>
+  </p:timing>
 </p:sld>
 </file>
 

</xml_diff>

<commit_message>
updated PPT and changed the condition in controller1.py
</commit_message>
<xml_diff>
--- a/CIS 553.pptx
+++ b/CIS 553.pptx
@@ -220,7 +220,7 @@
             <a:fld id="{EE28FA45-A570-4675-9A80-6745B4AB3CF4}" type="datetimeFigureOut">
               <a:rPr lang="en-US" smtClean="0"/>
               <a:pPr/>
-              <a:t>4/27/2015</a:t>
+              <a:t>4/28/2015</a:t>
             </a:fld>
             <a:endParaRPr lang="en-US" dirty="0"/>
           </a:p>
@@ -673,7 +673,7 @@
             <a:fld id="{86EABF9D-55D1-4ABC-B2B8-6909863E06C4}" type="datetime1">
               <a:rPr lang="en-US" smtClean="0"/>
               <a:pPr/>
-              <a:t>4/27/2015</a:t>
+              <a:t>4/28/2015</a:t>
             </a:fld>
             <a:endParaRPr lang="en-US" dirty="0"/>
           </a:p>
@@ -844,7 +844,7 @@
             <a:fld id="{1A34E7B5-1BBA-4BEC-91C2-388B53AE324C}" type="datetime1">
               <a:rPr lang="en-US" smtClean="0"/>
               <a:pPr/>
-              <a:t>4/27/2015</a:t>
+              <a:t>4/28/2015</a:t>
             </a:fld>
             <a:endParaRPr lang="en-US" dirty="0"/>
           </a:p>
@@ -1025,7 +1025,7 @@
             <a:fld id="{236EA7FC-0D7D-48E2-8C44-E4ACED517D50}" type="datetime1">
               <a:rPr lang="en-US" smtClean="0"/>
               <a:pPr/>
-              <a:t>4/27/2015</a:t>
+              <a:t>4/28/2015</a:t>
             </a:fld>
             <a:endParaRPr lang="en-US" dirty="0"/>
           </a:p>
@@ -1196,7 +1196,7 @@
             <a:fld id="{4477E786-A377-4885-B9EA-47AE21D4DA2B}" type="datetime1">
               <a:rPr lang="en-US" smtClean="0"/>
               <a:pPr/>
-              <a:t>4/27/2015</a:t>
+              <a:t>4/28/2015</a:t>
             </a:fld>
             <a:endParaRPr lang="en-US" dirty="0"/>
           </a:p>
@@ -1443,7 +1443,7 @@
             <a:fld id="{03A7A27F-6732-42FB-9B19-EB1AE655B10D}" type="datetime1">
               <a:rPr lang="en-US" smtClean="0"/>
               <a:pPr/>
-              <a:t>4/27/2015</a:t>
+              <a:t>4/28/2015</a:t>
             </a:fld>
             <a:endParaRPr lang="en-US" dirty="0"/>
           </a:p>
@@ -1732,7 +1732,7 @@
             <a:fld id="{BAF0424E-9369-4CB1-85B4-6278B6D3BB08}" type="datetime1">
               <a:rPr lang="en-US" smtClean="0"/>
               <a:pPr/>
-              <a:t>4/27/2015</a:t>
+              <a:t>4/28/2015</a:t>
             </a:fld>
             <a:endParaRPr lang="en-US" dirty="0"/>
           </a:p>
@@ -2155,7 +2155,7 @@
             <a:fld id="{4A88A493-7AFC-484F-8EA0-959EFB73071D}" type="datetime1">
               <a:rPr lang="en-US" smtClean="0"/>
               <a:pPr/>
-              <a:t>4/27/2015</a:t>
+              <a:t>4/28/2015</a:t>
             </a:fld>
             <a:endParaRPr lang="en-US" dirty="0"/>
           </a:p>
@@ -2274,7 +2274,7 @@
             <a:fld id="{03A41017-DB15-4B3C-8D81-8559CACFE97E}" type="datetime1">
               <a:rPr lang="en-US" smtClean="0"/>
               <a:pPr/>
-              <a:t>4/27/2015</a:t>
+              <a:t>4/28/2015</a:t>
             </a:fld>
             <a:endParaRPr lang="en-US" dirty="0"/>
           </a:p>
@@ -2370,7 +2370,7 @@
             <a:fld id="{47B9DDE3-CEB8-41BB-B704-0E1BE10E5C8C}" type="datetime1">
               <a:rPr lang="en-US" smtClean="0"/>
               <a:pPr/>
-              <a:t>4/27/2015</a:t>
+              <a:t>4/28/2015</a:t>
             </a:fld>
             <a:endParaRPr lang="en-US" dirty="0"/>
           </a:p>
@@ -2648,7 +2648,7 @@
             <a:fld id="{00111764-2798-4266-9A4D-05D182E3E276}" type="datetime1">
               <a:rPr lang="en-US" smtClean="0"/>
               <a:pPr/>
-              <a:t>4/27/2015</a:t>
+              <a:t>4/28/2015</a:t>
             </a:fld>
             <a:endParaRPr lang="en-US" dirty="0"/>
           </a:p>
@@ -2902,7 +2902,7 @@
             <a:fld id="{1E1CBCE8-42A1-4DA2-B9F0-D97137C26A27}" type="datetime1">
               <a:rPr lang="en-US" smtClean="0"/>
               <a:pPr/>
-              <a:t>4/27/2015</a:t>
+              <a:t>4/28/2015</a:t>
             </a:fld>
             <a:endParaRPr lang="en-US" dirty="0"/>
           </a:p>
@@ -3116,7 +3116,7 @@
             <a:fld id="{8B5BFA45-ECBA-40CD-8EA1-2AA7CB07BBB0}" type="datetime1">
               <a:rPr lang="en-US" smtClean="0"/>
               <a:pPr/>
-              <a:t>4/27/2015</a:t>
+              <a:t>4/28/2015</a:t>
             </a:fld>
             <a:endParaRPr lang="en-US" dirty="0"/>
           </a:p>
@@ -3611,7 +3611,7 @@
             <a:fld id="{ECFD9DA1-D5D0-45C3-9889-3F59E1322070}" type="datetime1">
               <a:rPr lang="en-US" smtClean="0"/>
               <a:pPr/>
-              <a:t>4/27/2015</a:t>
+              <a:t>4/28/2015</a:t>
             </a:fld>
             <a:endParaRPr lang="en-US" dirty="0"/>
           </a:p>
@@ -3769,7 +3769,7 @@
             <a:fld id="{4477E786-A377-4885-B9EA-47AE21D4DA2B}" type="datetime1">
               <a:rPr lang="en-US" smtClean="0"/>
               <a:pPr/>
-              <a:t>4/27/2015</a:t>
+              <a:t>4/28/2015</a:t>
             </a:fld>
             <a:endParaRPr lang="en-US"/>
           </a:p>
@@ -3822,6 +3822,312 @@
           </a:p>
         </p:txBody>
       </p:sp>
+      <p:sp>
+        <p:nvSpPr>
+          <p:cNvPr id="8" name="TextBox 7"/>
+          <p:cNvSpPr txBox="1"/>
+          <p:nvPr/>
+        </p:nvSpPr>
+        <p:spPr>
+          <a:xfrm>
+            <a:off x="152400" y="4724400"/>
+            <a:ext cx="1676400" cy="307777"/>
+          </a:xfrm>
+          <a:prstGeom prst="rect">
+            <a:avLst/>
+          </a:prstGeom>
+          <a:noFill/>
+        </p:spPr>
+        <p:txBody>
+          <a:bodyPr wrap="square" rtlCol="0">
+            <a:spAutoFit/>
+          </a:bodyPr>
+          <a:lstStyle/>
+          <a:p>
+            <a:r>
+              <a:rPr lang="en-US" sz="1400" dirty="0" smtClean="0"/>
+              <a:t>BW : 119 Kbps</a:t>
+            </a:r>
+            <a:endParaRPr lang="en-US" sz="1400" dirty="0"/>
+          </a:p>
+        </p:txBody>
+      </p:sp>
+      <p:sp>
+        <p:nvSpPr>
+          <p:cNvPr id="9" name="TextBox 8"/>
+          <p:cNvSpPr txBox="1"/>
+          <p:nvPr/>
+        </p:nvSpPr>
+        <p:spPr>
+          <a:xfrm>
+            <a:off x="3581400" y="5715000"/>
+            <a:ext cx="1676400" cy="307777"/>
+          </a:xfrm>
+          <a:prstGeom prst="rect">
+            <a:avLst/>
+          </a:prstGeom>
+          <a:noFill/>
+        </p:spPr>
+        <p:txBody>
+          <a:bodyPr wrap="square" rtlCol="0">
+            <a:spAutoFit/>
+          </a:bodyPr>
+          <a:lstStyle/>
+          <a:p>
+            <a:r>
+              <a:rPr lang="en-US" sz="1400" dirty="0" smtClean="0"/>
+              <a:t>BW : 59 Kbps</a:t>
+            </a:r>
+            <a:endParaRPr lang="en-US" sz="1400" dirty="0"/>
+          </a:p>
+        </p:txBody>
+      </p:sp>
+      <p:sp>
+        <p:nvSpPr>
+          <p:cNvPr id="10" name="TextBox 9"/>
+          <p:cNvSpPr txBox="1"/>
+          <p:nvPr/>
+        </p:nvSpPr>
+        <p:spPr>
+          <a:xfrm>
+            <a:off x="7467600" y="4648200"/>
+            <a:ext cx="1676400" cy="307777"/>
+          </a:xfrm>
+          <a:prstGeom prst="rect">
+            <a:avLst/>
+          </a:prstGeom>
+          <a:noFill/>
+        </p:spPr>
+        <p:txBody>
+          <a:bodyPr wrap="square" rtlCol="0">
+            <a:spAutoFit/>
+          </a:bodyPr>
+          <a:lstStyle/>
+          <a:p>
+            <a:r>
+              <a:rPr lang="en-US" sz="1400" dirty="0" smtClean="0"/>
+              <a:t>BW : 60 Kbps</a:t>
+            </a:r>
+            <a:endParaRPr lang="en-US" sz="1400" dirty="0"/>
+          </a:p>
+        </p:txBody>
+      </p:sp>
+      <p:sp>
+        <p:nvSpPr>
+          <p:cNvPr id="11" name="TextBox 10"/>
+          <p:cNvSpPr txBox="1"/>
+          <p:nvPr/>
+        </p:nvSpPr>
+        <p:spPr>
+          <a:xfrm>
+            <a:off x="7467600" y="3505200"/>
+            <a:ext cx="1676400" cy="307777"/>
+          </a:xfrm>
+          <a:prstGeom prst="rect">
+            <a:avLst/>
+          </a:prstGeom>
+          <a:noFill/>
+        </p:spPr>
+        <p:txBody>
+          <a:bodyPr wrap="square" rtlCol="0">
+            <a:spAutoFit/>
+          </a:bodyPr>
+          <a:lstStyle/>
+          <a:p>
+            <a:r>
+              <a:rPr lang="en-US" sz="1400" dirty="0" smtClean="0"/>
+              <a:t>BW : 120 Kbps</a:t>
+            </a:r>
+            <a:endParaRPr lang="en-US" sz="1400" dirty="0"/>
+          </a:p>
+        </p:txBody>
+      </p:sp>
+      <p:sp>
+        <p:nvSpPr>
+          <p:cNvPr id="12" name="Rectangle 11"/>
+          <p:cNvSpPr/>
+          <p:nvPr/>
+        </p:nvSpPr>
+        <p:spPr>
+          <a:xfrm>
+            <a:off x="533400" y="1676400"/>
+            <a:ext cx="1066800" cy="838200"/>
+          </a:xfrm>
+          <a:prstGeom prst="rect">
+            <a:avLst/>
+          </a:prstGeom>
+          <a:solidFill>
+            <a:schemeClr val="bg1"/>
+          </a:solidFill>
+          <a:ln>
+            <a:solidFill>
+              <a:schemeClr val="bg1"/>
+            </a:solidFill>
+          </a:ln>
+        </p:spPr>
+        <p:style>
+          <a:lnRef idx="2">
+            <a:schemeClr val="accent1">
+              <a:shade val="50000"/>
+            </a:schemeClr>
+          </a:lnRef>
+          <a:fillRef idx="1">
+            <a:schemeClr val="accent1"/>
+          </a:fillRef>
+          <a:effectRef idx="0">
+            <a:schemeClr val="accent1"/>
+          </a:effectRef>
+          <a:fontRef idx="minor">
+            <a:schemeClr val="lt1"/>
+          </a:fontRef>
+        </p:style>
+        <p:txBody>
+          <a:bodyPr rtlCol="0" anchor="ctr"/>
+          <a:lstStyle/>
+          <a:p>
+            <a:pPr algn="ctr"/>
+            <a:endParaRPr lang="en-US"/>
+          </a:p>
+        </p:txBody>
+      </p:sp>
+      <p:cxnSp>
+        <p:nvCxnSpPr>
+          <p:cNvPr id="13" name="Straight Arrow Connector 12"/>
+          <p:cNvCxnSpPr/>
+          <p:nvPr/>
+        </p:nvCxnSpPr>
+        <p:spPr>
+          <a:xfrm flipV="1">
+            <a:off x="1447800" y="4800600"/>
+            <a:ext cx="381000" cy="1489"/>
+          </a:xfrm>
+          <a:prstGeom prst="straightConnector1">
+            <a:avLst/>
+          </a:prstGeom>
+          <a:ln>
+            <a:tailEnd type="arrow"/>
+          </a:ln>
+        </p:spPr>
+        <p:style>
+          <a:lnRef idx="3">
+            <a:schemeClr val="dk1"/>
+          </a:lnRef>
+          <a:fillRef idx="0">
+            <a:schemeClr val="dk1"/>
+          </a:fillRef>
+          <a:effectRef idx="2">
+            <a:schemeClr val="dk1"/>
+          </a:effectRef>
+          <a:fontRef idx="minor">
+            <a:schemeClr val="tx1"/>
+          </a:fontRef>
+        </p:style>
+      </p:cxnSp>
+      <p:cxnSp>
+        <p:nvCxnSpPr>
+          <p:cNvPr id="14" name="Straight Arrow Connector 13"/>
+          <p:cNvCxnSpPr>
+            <a:stCxn id="11" idx="1"/>
+          </p:cNvCxnSpPr>
+          <p:nvPr/>
+        </p:nvCxnSpPr>
+        <p:spPr>
+          <a:xfrm flipH="1">
+            <a:off x="5715000" y="3659089"/>
+            <a:ext cx="1752600" cy="227111"/>
+          </a:xfrm>
+          <a:prstGeom prst="straightConnector1">
+            <a:avLst/>
+          </a:prstGeom>
+          <a:ln>
+            <a:tailEnd type="arrow"/>
+          </a:ln>
+        </p:spPr>
+        <p:style>
+          <a:lnRef idx="3">
+            <a:schemeClr val="dk1"/>
+          </a:lnRef>
+          <a:fillRef idx="0">
+            <a:schemeClr val="dk1"/>
+          </a:fillRef>
+          <a:effectRef idx="2">
+            <a:schemeClr val="dk1"/>
+          </a:effectRef>
+          <a:fontRef idx="minor">
+            <a:schemeClr val="tx1"/>
+          </a:fontRef>
+        </p:style>
+      </p:cxnSp>
+      <p:cxnSp>
+        <p:nvCxnSpPr>
+          <p:cNvPr id="15" name="Straight Arrow Connector 14"/>
+          <p:cNvCxnSpPr>
+            <a:stCxn id="9" idx="0"/>
+          </p:cNvCxnSpPr>
+          <p:nvPr/>
+        </p:nvCxnSpPr>
+        <p:spPr>
+          <a:xfrm flipH="1" flipV="1">
+            <a:off x="3886200" y="4953000"/>
+            <a:ext cx="533400" cy="762000"/>
+          </a:xfrm>
+          <a:prstGeom prst="straightConnector1">
+            <a:avLst/>
+          </a:prstGeom>
+          <a:ln>
+            <a:tailEnd type="arrow"/>
+          </a:ln>
+        </p:spPr>
+        <p:style>
+          <a:lnRef idx="3">
+            <a:schemeClr val="dk1"/>
+          </a:lnRef>
+          <a:fillRef idx="0">
+            <a:schemeClr val="dk1"/>
+          </a:fillRef>
+          <a:effectRef idx="2">
+            <a:schemeClr val="dk1"/>
+          </a:effectRef>
+          <a:fontRef idx="minor">
+            <a:schemeClr val="tx1"/>
+          </a:fontRef>
+        </p:style>
+      </p:cxnSp>
+      <p:cxnSp>
+        <p:nvCxnSpPr>
+          <p:cNvPr id="16" name="Straight Arrow Connector 15"/>
+          <p:cNvCxnSpPr>
+            <a:stCxn id="10" idx="1"/>
+          </p:cNvCxnSpPr>
+          <p:nvPr/>
+        </p:nvCxnSpPr>
+        <p:spPr>
+          <a:xfrm flipH="1" flipV="1">
+            <a:off x="5867400" y="4648201"/>
+            <a:ext cx="1600200" cy="153888"/>
+          </a:xfrm>
+          <a:prstGeom prst="straightConnector1">
+            <a:avLst/>
+          </a:prstGeom>
+          <a:ln>
+            <a:tailEnd type="arrow"/>
+          </a:ln>
+        </p:spPr>
+        <p:style>
+          <a:lnRef idx="3">
+            <a:schemeClr val="dk1"/>
+          </a:lnRef>
+          <a:fillRef idx="0">
+            <a:schemeClr val="dk1"/>
+          </a:fillRef>
+          <a:effectRef idx="2">
+            <a:schemeClr val="dk1"/>
+          </a:effectRef>
+          <a:fontRef idx="minor">
+            <a:schemeClr val="tx1"/>
+          </a:fontRef>
+        </p:style>
+      </p:cxnSp>
     </p:spTree>
   </p:cSld>
   <p:clrMapOvr>
@@ -3906,23 +4212,15 @@
           <a:p>
             <a:r>
               <a:rPr lang="en-US" dirty="0" smtClean="0"/>
-              <a:t>Attack </a:t>
+              <a:t>Attack bandwidth mitigated to &lt; 60 </a:t>
             </a:r>
             <a:r>
               <a:rPr lang="en-US" dirty="0" smtClean="0"/>
-              <a:t>bandwidth </a:t>
+              <a:t>Kbps </a:t>
             </a:r>
             <a:r>
               <a:rPr lang="en-US" dirty="0" smtClean="0"/>
-              <a:t>mitigated to &lt; 60 </a:t>
-            </a:r>
-            <a:r>
-              <a:rPr lang="en-US" dirty="0" err="1" smtClean="0"/>
-              <a:t>kbit</a:t>
-            </a:r>
-            <a:r>
-              <a:rPr lang="en-US" dirty="0" smtClean="0"/>
-              <a:t>/s per attacker</a:t>
+              <a:t>per attacker</a:t>
             </a:r>
           </a:p>
           <a:p>
@@ -3931,12 +4229,8 @@
               <a:t>Automatic policy removal after traffic received from attacker &lt; 10 </a:t>
             </a:r>
             <a:r>
-              <a:rPr lang="en-US" dirty="0" err="1" smtClean="0"/>
-              <a:t>kbit</a:t>
-            </a:r>
-            <a:r>
               <a:rPr lang="en-US" dirty="0" smtClean="0"/>
-              <a:t>/s</a:t>
+              <a:t>Kbps</a:t>
             </a:r>
             <a:endParaRPr lang="en-US" dirty="0"/>
           </a:p>
@@ -3960,7 +4254,7 @@
             <a:fld id="{4477E786-A377-4885-B9EA-47AE21D4DA2B}" type="datetime1">
               <a:rPr lang="en-US" smtClean="0"/>
               <a:pPr/>
-              <a:t>4/27/2015</a:t>
+              <a:t>4/28/2015</a:t>
             </a:fld>
             <a:endParaRPr lang="en-US"/>
           </a:p>
@@ -4103,19 +4397,11 @@
             </a:r>
             <a:r>
               <a:rPr lang="de-DE" dirty="0" smtClean="0"/>
-              <a:t>very </a:t>
+              <a:t>very complex challenges that could surmount over our </a:t>
             </a:r>
             <a:r>
               <a:rPr lang="de-DE" dirty="0" smtClean="0"/>
-              <a:t>complex </a:t>
-            </a:r>
-            <a:r>
-              <a:rPr lang="de-DE" dirty="0" smtClean="0"/>
-              <a:t>challenges that </a:t>
-            </a:r>
-            <a:r>
-              <a:rPr lang="de-DE" smtClean="0"/>
-              <a:t>could surmount over our naive defence.</a:t>
+              <a:t>mitigation policy.</a:t>
             </a:r>
             <a:endParaRPr lang="en-US" dirty="0"/>
           </a:p>
@@ -4139,7 +4425,7 @@
             <a:fld id="{4477E786-A377-4885-B9EA-47AE21D4DA2B}" type="datetime1">
               <a:rPr lang="en-US" smtClean="0"/>
               <a:pPr/>
-              <a:t>4/27/2015</a:t>
+              <a:t>4/28/2015</a:t>
             </a:fld>
             <a:endParaRPr lang="en-US" dirty="0"/>
           </a:p>
@@ -4339,7 +4625,7 @@
             <a:fld id="{2852F238-DE6F-41DD-B4A1-639627BFED94}" type="datetime1">
               <a:rPr lang="en-US" smtClean="0"/>
               <a:pPr/>
-              <a:t>4/27/2015</a:t>
+              <a:t>4/28/2015</a:t>
             </a:fld>
             <a:endParaRPr lang="en-US"/>
           </a:p>
@@ -4465,7 +4751,7 @@
             <a:fld id="{4477E786-A377-4885-B9EA-47AE21D4DA2B}" type="datetime1">
               <a:rPr lang="en-US" smtClean="0"/>
               <a:pPr/>
-              <a:t>4/27/2015</a:t>
+              <a:t>4/28/2015</a:t>
             </a:fld>
             <a:endParaRPr lang="en-US"/>
           </a:p>
@@ -4536,11 +4822,256 @@
         </p:blipFill>
         <p:spPr>
           <a:xfrm>
-            <a:off x="561338" y="1600200"/>
+            <a:off x="685800" y="1676400"/>
             <a:ext cx="8021322" cy="4525963"/>
           </a:xfrm>
         </p:spPr>
       </p:pic>
+      <p:sp>
+        <p:nvSpPr>
+          <p:cNvPr id="7" name="TextBox 6"/>
+          <p:cNvSpPr txBox="1"/>
+          <p:nvPr/>
+        </p:nvSpPr>
+        <p:spPr>
+          <a:xfrm>
+            <a:off x="152400" y="4648200"/>
+            <a:ext cx="1676400" cy="307777"/>
+          </a:xfrm>
+          <a:prstGeom prst="rect">
+            <a:avLst/>
+          </a:prstGeom>
+          <a:noFill/>
+        </p:spPr>
+        <p:txBody>
+          <a:bodyPr wrap="square" rtlCol="0">
+            <a:spAutoFit/>
+          </a:bodyPr>
+          <a:lstStyle/>
+          <a:p>
+            <a:r>
+              <a:rPr lang="en-US" sz="1400" dirty="0" smtClean="0"/>
+              <a:t>BW : 7541Kbps</a:t>
+            </a:r>
+            <a:endParaRPr lang="en-US" sz="1400" dirty="0"/>
+          </a:p>
+        </p:txBody>
+      </p:sp>
+      <p:sp>
+        <p:nvSpPr>
+          <p:cNvPr id="8" name="TextBox 7"/>
+          <p:cNvSpPr txBox="1"/>
+          <p:nvPr/>
+        </p:nvSpPr>
+        <p:spPr>
+          <a:xfrm>
+            <a:off x="3733800" y="5867400"/>
+            <a:ext cx="1676400" cy="307777"/>
+          </a:xfrm>
+          <a:prstGeom prst="rect">
+            <a:avLst/>
+          </a:prstGeom>
+          <a:noFill/>
+        </p:spPr>
+        <p:txBody>
+          <a:bodyPr wrap="square" rtlCol="0">
+            <a:spAutoFit/>
+          </a:bodyPr>
+          <a:lstStyle/>
+          <a:p>
+            <a:r>
+              <a:rPr lang="en-US" sz="1400" dirty="0" smtClean="0"/>
+              <a:t>BW : 1958 Kbps</a:t>
+            </a:r>
+            <a:endParaRPr lang="en-US" sz="1400" dirty="0"/>
+          </a:p>
+        </p:txBody>
+      </p:sp>
+      <p:sp>
+        <p:nvSpPr>
+          <p:cNvPr id="10" name="TextBox 9"/>
+          <p:cNvSpPr txBox="1"/>
+          <p:nvPr/>
+        </p:nvSpPr>
+        <p:spPr>
+          <a:xfrm>
+            <a:off x="7315200" y="3505200"/>
+            <a:ext cx="1828800" cy="307777"/>
+          </a:xfrm>
+          <a:prstGeom prst="rect">
+            <a:avLst/>
+          </a:prstGeom>
+          <a:noFill/>
+        </p:spPr>
+        <p:txBody>
+          <a:bodyPr wrap="square" rtlCol="0">
+            <a:spAutoFit/>
+          </a:bodyPr>
+          <a:lstStyle/>
+          <a:p>
+            <a:r>
+              <a:rPr lang="en-US" sz="1400" dirty="0" smtClean="0"/>
+              <a:t>    BW </a:t>
+            </a:r>
+            <a:r>
+              <a:rPr lang="en-US" sz="1400" dirty="0" smtClean="0"/>
+              <a:t>: 5673 Kbps</a:t>
+            </a:r>
+            <a:endParaRPr lang="en-US" sz="1400" dirty="0"/>
+          </a:p>
+        </p:txBody>
+      </p:sp>
+      <p:sp>
+        <p:nvSpPr>
+          <p:cNvPr id="11" name="Rectangle 10"/>
+          <p:cNvSpPr/>
+          <p:nvPr/>
+        </p:nvSpPr>
+        <p:spPr>
+          <a:xfrm>
+            <a:off x="533400" y="1524000"/>
+            <a:ext cx="1066800" cy="838200"/>
+          </a:xfrm>
+          <a:prstGeom prst="rect">
+            <a:avLst/>
+          </a:prstGeom>
+          <a:solidFill>
+            <a:schemeClr val="bg1"/>
+          </a:solidFill>
+          <a:ln>
+            <a:solidFill>
+              <a:schemeClr val="bg1"/>
+            </a:solidFill>
+          </a:ln>
+        </p:spPr>
+        <p:style>
+          <a:lnRef idx="2">
+            <a:schemeClr val="accent1">
+              <a:shade val="50000"/>
+            </a:schemeClr>
+          </a:lnRef>
+          <a:fillRef idx="1">
+            <a:schemeClr val="accent1"/>
+          </a:fillRef>
+          <a:effectRef idx="0">
+            <a:schemeClr val="accent1"/>
+          </a:effectRef>
+          <a:fontRef idx="minor">
+            <a:schemeClr val="lt1"/>
+          </a:fontRef>
+        </p:style>
+        <p:txBody>
+          <a:bodyPr rtlCol="0" anchor="ctr"/>
+          <a:lstStyle/>
+          <a:p>
+            <a:pPr algn="ctr"/>
+            <a:endParaRPr lang="en-US"/>
+          </a:p>
+        </p:txBody>
+      </p:sp>
+      <p:cxnSp>
+        <p:nvCxnSpPr>
+          <p:cNvPr id="13" name="Straight Arrow Connector 12"/>
+          <p:cNvCxnSpPr/>
+          <p:nvPr/>
+        </p:nvCxnSpPr>
+        <p:spPr>
+          <a:xfrm>
+            <a:off x="1371600" y="4800600"/>
+            <a:ext cx="304800" cy="0"/>
+          </a:xfrm>
+          <a:prstGeom prst="straightConnector1">
+            <a:avLst/>
+          </a:prstGeom>
+          <a:ln>
+            <a:tailEnd type="arrow"/>
+          </a:ln>
+        </p:spPr>
+        <p:style>
+          <a:lnRef idx="3">
+            <a:schemeClr val="dk1"/>
+          </a:lnRef>
+          <a:fillRef idx="0">
+            <a:schemeClr val="dk1"/>
+          </a:fillRef>
+          <a:effectRef idx="2">
+            <a:schemeClr val="dk1"/>
+          </a:effectRef>
+          <a:fontRef idx="minor">
+            <a:schemeClr val="tx1"/>
+          </a:fontRef>
+        </p:style>
+      </p:cxnSp>
+      <p:cxnSp>
+        <p:nvCxnSpPr>
+          <p:cNvPr id="18" name="Straight Arrow Connector 17"/>
+          <p:cNvCxnSpPr>
+            <a:stCxn id="8" idx="0"/>
+          </p:cNvCxnSpPr>
+          <p:nvPr/>
+        </p:nvCxnSpPr>
+        <p:spPr>
+          <a:xfrm flipH="1" flipV="1">
+            <a:off x="3886200" y="4495800"/>
+            <a:ext cx="685800" cy="1371600"/>
+          </a:xfrm>
+          <a:prstGeom prst="straightConnector1">
+            <a:avLst/>
+          </a:prstGeom>
+          <a:ln>
+            <a:tailEnd type="arrow"/>
+          </a:ln>
+        </p:spPr>
+        <p:style>
+          <a:lnRef idx="3">
+            <a:schemeClr val="dk1"/>
+          </a:lnRef>
+          <a:fillRef idx="0">
+            <a:schemeClr val="dk1"/>
+          </a:fillRef>
+          <a:effectRef idx="2">
+            <a:schemeClr val="dk1"/>
+          </a:effectRef>
+          <a:fontRef idx="minor">
+            <a:schemeClr val="tx1"/>
+          </a:fontRef>
+        </p:style>
+      </p:cxnSp>
+      <p:cxnSp>
+        <p:nvCxnSpPr>
+          <p:cNvPr id="23" name="Straight Arrow Connector 22"/>
+          <p:cNvCxnSpPr>
+            <a:stCxn id="10" idx="1"/>
+          </p:cNvCxnSpPr>
+          <p:nvPr/>
+        </p:nvCxnSpPr>
+        <p:spPr>
+          <a:xfrm flipH="1">
+            <a:off x="5867400" y="3659089"/>
+            <a:ext cx="1447800" cy="150911"/>
+          </a:xfrm>
+          <a:prstGeom prst="straightConnector1">
+            <a:avLst/>
+          </a:prstGeom>
+          <a:ln>
+            <a:tailEnd type="arrow"/>
+          </a:ln>
+        </p:spPr>
+        <p:style>
+          <a:lnRef idx="3">
+            <a:schemeClr val="dk1"/>
+          </a:lnRef>
+          <a:fillRef idx="0">
+            <a:schemeClr val="dk1"/>
+          </a:fillRef>
+          <a:effectRef idx="2">
+            <a:schemeClr val="dk1"/>
+          </a:effectRef>
+          <a:fontRef idx="minor">
+            <a:schemeClr val="tx1"/>
+          </a:fontRef>
+        </p:style>
+      </p:cxnSp>
     </p:spTree>
   </p:cSld>
   <p:clrMapOvr>
@@ -4670,7 +5201,7 @@
             <a:fld id="{46298D32-FE18-4BCA-BDD4-353085F665D3}" type="datetime1">
               <a:rPr lang="en-US" smtClean="0"/>
               <a:pPr/>
-              <a:t>4/27/2015</a:t>
+              <a:t>4/28/2015</a:t>
             </a:fld>
             <a:endParaRPr lang="en-US"/>
           </a:p>
@@ -4739,7 +5270,7 @@
 </file>
 
 <file path=ppt/slides/slide5.xml><?xml version="1.0" encoding="utf-8"?>
-<p:sld xmlns:a="http://schemas.openxmlformats.org/drawingml/2006/main" xmlns:r="http://schemas.openxmlformats.org/officeDocument/2006/relationships" xmlns:p="http://schemas.openxmlformats.org/presentationml/2006/main">
+<p:sld xmlns:a="http://schemas.openxmlformats.org/drawingml/2006/main" xmlns:r="http://schemas.openxmlformats.org/officeDocument/2006/relationships" xmlns:p="http://schemas.openxmlformats.org/presentationml/2006/main" show="0">
   <p:cSld>
     <p:spTree>
       <p:nvGrpSpPr>
@@ -4839,7 +5370,7 @@
             <a:fld id="{687E2636-3B7C-4E31-9AF8-5289C40F57F7}" type="datetime1">
               <a:rPr lang="en-US" smtClean="0"/>
               <a:pPr/>
-              <a:t>4/27/2015</a:t>
+              <a:t>4/28/2015</a:t>
             </a:fld>
             <a:endParaRPr lang="en-US"/>
           </a:p>
@@ -4897,6 +5428,7 @@
   <p:clrMapOvr>
     <a:masterClrMapping/>
   </p:clrMapOvr>
+  <p:transition/>
   <p:timing>
     <p:tnLst>
       <p:par>
@@ -5010,7 +5542,7 @@
             <a:fld id="{4477E786-A377-4885-B9EA-47AE21D4DA2B}" type="datetime1">
               <a:rPr lang="en-US" smtClean="0"/>
               <a:pPr/>
-              <a:t>4/27/2015</a:t>
+              <a:t>4/28/2015</a:t>
             </a:fld>
             <a:endParaRPr lang="en-US"/>
           </a:p>
@@ -5176,7 +5708,7 @@
             <a:fld id="{4477E786-A377-4885-B9EA-47AE21D4DA2B}" type="datetime1">
               <a:rPr lang="en-US" smtClean="0"/>
               <a:pPr/>
-              <a:t>4/27/2015</a:t>
+              <a:t>4/28/2015</a:t>
             </a:fld>
             <a:endParaRPr lang="en-US"/>
           </a:p>
@@ -5229,6 +5761,249 @@
           </a:p>
         </p:txBody>
       </p:sp>
+      <p:sp>
+        <p:nvSpPr>
+          <p:cNvPr id="8" name="TextBox 7"/>
+          <p:cNvSpPr txBox="1"/>
+          <p:nvPr/>
+        </p:nvSpPr>
+        <p:spPr>
+          <a:xfrm>
+            <a:off x="0" y="4648200"/>
+            <a:ext cx="1447800" cy="307777"/>
+          </a:xfrm>
+          <a:prstGeom prst="rect">
+            <a:avLst/>
+          </a:prstGeom>
+          <a:noFill/>
+        </p:spPr>
+        <p:txBody>
+          <a:bodyPr wrap="square" rtlCol="0">
+            <a:spAutoFit/>
+          </a:bodyPr>
+          <a:lstStyle/>
+          <a:p>
+            <a:r>
+              <a:rPr lang="en-US" sz="1400" dirty="0" smtClean="0"/>
+              <a:t>BW : 5559 Kbps</a:t>
+            </a:r>
+            <a:endParaRPr lang="en-US" sz="1400" dirty="0"/>
+          </a:p>
+        </p:txBody>
+      </p:sp>
+      <p:sp>
+        <p:nvSpPr>
+          <p:cNvPr id="9" name="TextBox 8"/>
+          <p:cNvSpPr txBox="1"/>
+          <p:nvPr/>
+        </p:nvSpPr>
+        <p:spPr>
+          <a:xfrm>
+            <a:off x="3810000" y="5638800"/>
+            <a:ext cx="1676400" cy="307777"/>
+          </a:xfrm>
+          <a:prstGeom prst="rect">
+            <a:avLst/>
+          </a:prstGeom>
+          <a:noFill/>
+        </p:spPr>
+        <p:txBody>
+          <a:bodyPr wrap="square" rtlCol="0">
+            <a:spAutoFit/>
+          </a:bodyPr>
+          <a:lstStyle/>
+          <a:p>
+            <a:r>
+              <a:rPr lang="en-US" sz="1400" dirty="0" smtClean="0"/>
+              <a:t>BW : 61 Kbps</a:t>
+            </a:r>
+            <a:endParaRPr lang="en-US" sz="1400" dirty="0"/>
+          </a:p>
+        </p:txBody>
+      </p:sp>
+      <p:sp>
+        <p:nvSpPr>
+          <p:cNvPr id="10" name="TextBox 9"/>
+          <p:cNvSpPr txBox="1"/>
+          <p:nvPr/>
+        </p:nvSpPr>
+        <p:spPr>
+          <a:xfrm>
+            <a:off x="7239000" y="3657600"/>
+            <a:ext cx="1676400" cy="307777"/>
+          </a:xfrm>
+          <a:prstGeom prst="rect">
+            <a:avLst/>
+          </a:prstGeom>
+          <a:noFill/>
+        </p:spPr>
+        <p:txBody>
+          <a:bodyPr wrap="square" rtlCol="0">
+            <a:spAutoFit/>
+          </a:bodyPr>
+          <a:lstStyle/>
+          <a:p>
+            <a:r>
+              <a:rPr lang="en-US" sz="1400" dirty="0" smtClean="0"/>
+              <a:t>BW : 5426 Kbps</a:t>
+            </a:r>
+            <a:endParaRPr lang="en-US" sz="1400" dirty="0"/>
+          </a:p>
+        </p:txBody>
+      </p:sp>
+      <p:sp>
+        <p:nvSpPr>
+          <p:cNvPr id="11" name="Rectangle 10"/>
+          <p:cNvSpPr/>
+          <p:nvPr/>
+        </p:nvSpPr>
+        <p:spPr>
+          <a:xfrm>
+            <a:off x="609600" y="1600200"/>
+            <a:ext cx="1066800" cy="838200"/>
+          </a:xfrm>
+          <a:prstGeom prst="rect">
+            <a:avLst/>
+          </a:prstGeom>
+          <a:solidFill>
+            <a:schemeClr val="bg1"/>
+          </a:solidFill>
+          <a:ln>
+            <a:solidFill>
+              <a:schemeClr val="bg1"/>
+            </a:solidFill>
+          </a:ln>
+        </p:spPr>
+        <p:style>
+          <a:lnRef idx="2">
+            <a:schemeClr val="accent1">
+              <a:shade val="50000"/>
+            </a:schemeClr>
+          </a:lnRef>
+          <a:fillRef idx="1">
+            <a:schemeClr val="accent1"/>
+          </a:fillRef>
+          <a:effectRef idx="0">
+            <a:schemeClr val="accent1"/>
+          </a:effectRef>
+          <a:fontRef idx="minor">
+            <a:schemeClr val="lt1"/>
+          </a:fontRef>
+        </p:style>
+        <p:txBody>
+          <a:bodyPr rtlCol="0" anchor="ctr"/>
+          <a:lstStyle/>
+          <a:p>
+            <a:pPr algn="ctr"/>
+            <a:endParaRPr lang="en-US"/>
+          </a:p>
+        </p:txBody>
+      </p:sp>
+      <p:cxnSp>
+        <p:nvCxnSpPr>
+          <p:cNvPr id="13" name="Straight Arrow Connector 12"/>
+          <p:cNvCxnSpPr>
+            <a:stCxn id="8" idx="3"/>
+          </p:cNvCxnSpPr>
+          <p:nvPr/>
+        </p:nvCxnSpPr>
+        <p:spPr>
+          <a:xfrm flipV="1">
+            <a:off x="1447800" y="4800600"/>
+            <a:ext cx="381000" cy="1489"/>
+          </a:xfrm>
+          <a:prstGeom prst="straightConnector1">
+            <a:avLst/>
+          </a:prstGeom>
+          <a:ln>
+            <a:tailEnd type="arrow"/>
+          </a:ln>
+        </p:spPr>
+        <p:style>
+          <a:lnRef idx="3">
+            <a:schemeClr val="dk1"/>
+          </a:lnRef>
+          <a:fillRef idx="0">
+            <a:schemeClr val="dk1"/>
+          </a:fillRef>
+          <a:effectRef idx="2">
+            <a:schemeClr val="dk1"/>
+          </a:effectRef>
+          <a:fontRef idx="minor">
+            <a:schemeClr val="tx1"/>
+          </a:fontRef>
+        </p:style>
+      </p:cxnSp>
+      <p:cxnSp>
+        <p:nvCxnSpPr>
+          <p:cNvPr id="17" name="Straight Arrow Connector 16"/>
+          <p:cNvCxnSpPr>
+            <a:stCxn id="10" idx="1"/>
+          </p:cNvCxnSpPr>
+          <p:nvPr/>
+        </p:nvCxnSpPr>
+        <p:spPr>
+          <a:xfrm flipH="1">
+            <a:off x="5715000" y="3811489"/>
+            <a:ext cx="1524000" cy="74711"/>
+          </a:xfrm>
+          <a:prstGeom prst="straightConnector1">
+            <a:avLst/>
+          </a:prstGeom>
+          <a:ln>
+            <a:tailEnd type="arrow"/>
+          </a:ln>
+        </p:spPr>
+        <p:style>
+          <a:lnRef idx="3">
+            <a:schemeClr val="dk1"/>
+          </a:lnRef>
+          <a:fillRef idx="0">
+            <a:schemeClr val="dk1"/>
+          </a:fillRef>
+          <a:effectRef idx="2">
+            <a:schemeClr val="dk1"/>
+          </a:effectRef>
+          <a:fontRef idx="minor">
+            <a:schemeClr val="tx1"/>
+          </a:fontRef>
+        </p:style>
+      </p:cxnSp>
+      <p:cxnSp>
+        <p:nvCxnSpPr>
+          <p:cNvPr id="20" name="Straight Arrow Connector 19"/>
+          <p:cNvCxnSpPr>
+            <a:stCxn id="9" idx="0"/>
+          </p:cNvCxnSpPr>
+          <p:nvPr/>
+        </p:nvCxnSpPr>
+        <p:spPr>
+          <a:xfrm flipH="1" flipV="1">
+            <a:off x="3810000" y="4495800"/>
+            <a:ext cx="838200" cy="1143000"/>
+          </a:xfrm>
+          <a:prstGeom prst="straightConnector1">
+            <a:avLst/>
+          </a:prstGeom>
+          <a:ln>
+            <a:tailEnd type="arrow"/>
+          </a:ln>
+        </p:spPr>
+        <p:style>
+          <a:lnRef idx="3">
+            <a:schemeClr val="dk1"/>
+          </a:lnRef>
+          <a:fillRef idx="0">
+            <a:schemeClr val="dk1"/>
+          </a:fillRef>
+          <a:effectRef idx="2">
+            <a:schemeClr val="dk1"/>
+          </a:effectRef>
+          <a:fontRef idx="minor">
+            <a:schemeClr val="tx1"/>
+          </a:fontRef>
+        </p:style>
+      </p:cxnSp>
     </p:spTree>
   </p:cSld>
   <p:clrMapOvr>
@@ -5357,7 +6132,7 @@
             <a:fld id="{4477E786-A377-4885-B9EA-47AE21D4DA2B}" type="datetime1">
               <a:rPr lang="en-US" smtClean="0"/>
               <a:pPr/>
-              <a:t>4/27/2015</a:t>
+              <a:t>4/28/2015</a:t>
             </a:fld>
             <a:endParaRPr lang="en-US"/>
           </a:p>
@@ -5500,7 +6275,7 @@
         </p:blipFill>
         <p:spPr>
           <a:xfrm>
-            <a:off x="765005" y="1600200"/>
+            <a:off x="765005" y="1524000"/>
             <a:ext cx="7613990" cy="4525962"/>
           </a:xfrm>
         </p:spPr>
@@ -5523,7 +6298,7 @@
             <a:fld id="{4477E786-A377-4885-B9EA-47AE21D4DA2B}" type="datetime1">
               <a:rPr lang="en-US" smtClean="0"/>
               <a:pPr/>
-              <a:t>4/27/2015</a:t>
+              <a:t>4/28/2015</a:t>
             </a:fld>
             <a:endParaRPr lang="en-US"/>
           </a:p>
@@ -5576,6 +6351,312 @@
           </a:p>
         </p:txBody>
       </p:sp>
+      <p:sp>
+        <p:nvSpPr>
+          <p:cNvPr id="8" name="TextBox 7"/>
+          <p:cNvSpPr txBox="1"/>
+          <p:nvPr/>
+        </p:nvSpPr>
+        <p:spPr>
+          <a:xfrm>
+            <a:off x="152400" y="4724400"/>
+            <a:ext cx="1676400" cy="307777"/>
+          </a:xfrm>
+          <a:prstGeom prst="rect">
+            <a:avLst/>
+          </a:prstGeom>
+          <a:noFill/>
+        </p:spPr>
+        <p:txBody>
+          <a:bodyPr wrap="square" rtlCol="0">
+            <a:spAutoFit/>
+          </a:bodyPr>
+          <a:lstStyle/>
+          <a:p>
+            <a:r>
+              <a:rPr lang="en-US" sz="1400" dirty="0" smtClean="0"/>
+              <a:t>BW : 87 Kbps</a:t>
+            </a:r>
+            <a:endParaRPr lang="en-US" sz="1400" dirty="0"/>
+          </a:p>
+        </p:txBody>
+      </p:sp>
+      <p:sp>
+        <p:nvSpPr>
+          <p:cNvPr id="9" name="TextBox 8"/>
+          <p:cNvSpPr txBox="1"/>
+          <p:nvPr/>
+        </p:nvSpPr>
+        <p:spPr>
+          <a:xfrm>
+            <a:off x="7315200" y="4648200"/>
+            <a:ext cx="1676400" cy="307777"/>
+          </a:xfrm>
+          <a:prstGeom prst="rect">
+            <a:avLst/>
+          </a:prstGeom>
+          <a:noFill/>
+        </p:spPr>
+        <p:txBody>
+          <a:bodyPr wrap="square" rtlCol="0">
+            <a:spAutoFit/>
+          </a:bodyPr>
+          <a:lstStyle/>
+          <a:p>
+            <a:r>
+              <a:rPr lang="en-US" sz="1400" dirty="0" smtClean="0"/>
+              <a:t>BW : 6649Kbps</a:t>
+            </a:r>
+            <a:endParaRPr lang="en-US" sz="1400" dirty="0"/>
+          </a:p>
+        </p:txBody>
+      </p:sp>
+      <p:sp>
+        <p:nvSpPr>
+          <p:cNvPr id="10" name="TextBox 9"/>
+          <p:cNvSpPr txBox="1"/>
+          <p:nvPr/>
+        </p:nvSpPr>
+        <p:spPr>
+          <a:xfrm>
+            <a:off x="3581400" y="5715000"/>
+            <a:ext cx="1676400" cy="307777"/>
+          </a:xfrm>
+          <a:prstGeom prst="rect">
+            <a:avLst/>
+          </a:prstGeom>
+          <a:noFill/>
+        </p:spPr>
+        <p:txBody>
+          <a:bodyPr wrap="square" rtlCol="0">
+            <a:spAutoFit/>
+          </a:bodyPr>
+          <a:lstStyle/>
+          <a:p>
+            <a:r>
+              <a:rPr lang="en-US" sz="1400" dirty="0" smtClean="0"/>
+              <a:t>BW : 59 Kbps</a:t>
+            </a:r>
+            <a:endParaRPr lang="en-US" sz="1400" dirty="0"/>
+          </a:p>
+        </p:txBody>
+      </p:sp>
+      <p:sp>
+        <p:nvSpPr>
+          <p:cNvPr id="11" name="TextBox 10"/>
+          <p:cNvSpPr txBox="1"/>
+          <p:nvPr/>
+        </p:nvSpPr>
+        <p:spPr>
+          <a:xfrm>
+            <a:off x="7315200" y="3581400"/>
+            <a:ext cx="1676400" cy="307777"/>
+          </a:xfrm>
+          <a:prstGeom prst="rect">
+            <a:avLst/>
+          </a:prstGeom>
+          <a:noFill/>
+        </p:spPr>
+        <p:txBody>
+          <a:bodyPr wrap="square" rtlCol="0">
+            <a:spAutoFit/>
+          </a:bodyPr>
+          <a:lstStyle/>
+          <a:p>
+            <a:r>
+              <a:rPr lang="en-US" sz="1400" dirty="0" smtClean="0"/>
+              <a:t>BW : 39 Kbps</a:t>
+            </a:r>
+            <a:endParaRPr lang="en-US" sz="1400" dirty="0"/>
+          </a:p>
+        </p:txBody>
+      </p:sp>
+      <p:sp>
+        <p:nvSpPr>
+          <p:cNvPr id="13" name="Rectangle 12"/>
+          <p:cNvSpPr/>
+          <p:nvPr/>
+        </p:nvSpPr>
+        <p:spPr>
+          <a:xfrm>
+            <a:off x="609600" y="1524000"/>
+            <a:ext cx="1066800" cy="838200"/>
+          </a:xfrm>
+          <a:prstGeom prst="rect">
+            <a:avLst/>
+          </a:prstGeom>
+          <a:solidFill>
+            <a:schemeClr val="bg1"/>
+          </a:solidFill>
+          <a:ln>
+            <a:solidFill>
+              <a:schemeClr val="bg1"/>
+            </a:solidFill>
+          </a:ln>
+        </p:spPr>
+        <p:style>
+          <a:lnRef idx="2">
+            <a:schemeClr val="accent1">
+              <a:shade val="50000"/>
+            </a:schemeClr>
+          </a:lnRef>
+          <a:fillRef idx="1">
+            <a:schemeClr val="accent1"/>
+          </a:fillRef>
+          <a:effectRef idx="0">
+            <a:schemeClr val="accent1"/>
+          </a:effectRef>
+          <a:fontRef idx="minor">
+            <a:schemeClr val="lt1"/>
+          </a:fontRef>
+        </p:style>
+        <p:txBody>
+          <a:bodyPr rtlCol="0" anchor="ctr"/>
+          <a:lstStyle/>
+          <a:p>
+            <a:pPr algn="ctr"/>
+            <a:endParaRPr lang="en-US"/>
+          </a:p>
+        </p:txBody>
+      </p:sp>
+      <p:cxnSp>
+        <p:nvCxnSpPr>
+          <p:cNvPr id="12" name="Straight Arrow Connector 11"/>
+          <p:cNvCxnSpPr/>
+          <p:nvPr/>
+        </p:nvCxnSpPr>
+        <p:spPr>
+          <a:xfrm flipV="1">
+            <a:off x="1371600" y="4800601"/>
+            <a:ext cx="457200" cy="76199"/>
+          </a:xfrm>
+          <a:prstGeom prst="straightConnector1">
+            <a:avLst/>
+          </a:prstGeom>
+          <a:ln>
+            <a:tailEnd type="arrow"/>
+          </a:ln>
+        </p:spPr>
+        <p:style>
+          <a:lnRef idx="3">
+            <a:schemeClr val="dk1"/>
+          </a:lnRef>
+          <a:fillRef idx="0">
+            <a:schemeClr val="dk1"/>
+          </a:fillRef>
+          <a:effectRef idx="2">
+            <a:schemeClr val="dk1"/>
+          </a:effectRef>
+          <a:fontRef idx="minor">
+            <a:schemeClr val="tx1"/>
+          </a:fontRef>
+        </p:style>
+      </p:cxnSp>
+      <p:cxnSp>
+        <p:nvCxnSpPr>
+          <p:cNvPr id="14" name="Straight Arrow Connector 13"/>
+          <p:cNvCxnSpPr>
+            <a:stCxn id="11" idx="1"/>
+          </p:cNvCxnSpPr>
+          <p:nvPr/>
+        </p:nvCxnSpPr>
+        <p:spPr>
+          <a:xfrm flipH="1">
+            <a:off x="5562600" y="3735289"/>
+            <a:ext cx="1752600" cy="150911"/>
+          </a:xfrm>
+          <a:prstGeom prst="straightConnector1">
+            <a:avLst/>
+          </a:prstGeom>
+          <a:ln>
+            <a:tailEnd type="arrow"/>
+          </a:ln>
+        </p:spPr>
+        <p:style>
+          <a:lnRef idx="3">
+            <a:schemeClr val="dk1"/>
+          </a:lnRef>
+          <a:fillRef idx="0">
+            <a:schemeClr val="dk1"/>
+          </a:fillRef>
+          <a:effectRef idx="2">
+            <a:schemeClr val="dk1"/>
+          </a:effectRef>
+          <a:fontRef idx="minor">
+            <a:schemeClr val="tx1"/>
+          </a:fontRef>
+        </p:style>
+      </p:cxnSp>
+      <p:cxnSp>
+        <p:nvCxnSpPr>
+          <p:cNvPr id="15" name="Straight Arrow Connector 14"/>
+          <p:cNvCxnSpPr>
+            <a:stCxn id="10" idx="0"/>
+          </p:cNvCxnSpPr>
+          <p:nvPr/>
+        </p:nvCxnSpPr>
+        <p:spPr>
+          <a:xfrm flipH="1" flipV="1">
+            <a:off x="3886200" y="4876800"/>
+            <a:ext cx="533400" cy="838200"/>
+          </a:xfrm>
+          <a:prstGeom prst="straightConnector1">
+            <a:avLst/>
+          </a:prstGeom>
+          <a:ln>
+            <a:tailEnd type="arrow"/>
+          </a:ln>
+        </p:spPr>
+        <p:style>
+          <a:lnRef idx="3">
+            <a:schemeClr val="dk1"/>
+          </a:lnRef>
+          <a:fillRef idx="0">
+            <a:schemeClr val="dk1"/>
+          </a:fillRef>
+          <a:effectRef idx="2">
+            <a:schemeClr val="dk1"/>
+          </a:effectRef>
+          <a:fontRef idx="minor">
+            <a:schemeClr val="tx1"/>
+          </a:fontRef>
+        </p:style>
+      </p:cxnSp>
+      <p:cxnSp>
+        <p:nvCxnSpPr>
+          <p:cNvPr id="19" name="Straight Arrow Connector 18"/>
+          <p:cNvCxnSpPr>
+            <a:stCxn id="9" idx="1"/>
+          </p:cNvCxnSpPr>
+          <p:nvPr/>
+        </p:nvCxnSpPr>
+        <p:spPr>
+          <a:xfrm flipH="1" flipV="1">
+            <a:off x="5867400" y="4648200"/>
+            <a:ext cx="1447800" cy="153889"/>
+          </a:xfrm>
+          <a:prstGeom prst="straightConnector1">
+            <a:avLst/>
+          </a:prstGeom>
+          <a:ln>
+            <a:tailEnd type="arrow"/>
+          </a:ln>
+        </p:spPr>
+        <p:style>
+          <a:lnRef idx="3">
+            <a:schemeClr val="dk1"/>
+          </a:lnRef>
+          <a:fillRef idx="0">
+            <a:schemeClr val="dk1"/>
+          </a:fillRef>
+          <a:effectRef idx="2">
+            <a:schemeClr val="dk1"/>
+          </a:effectRef>
+          <a:fontRef idx="minor">
+            <a:schemeClr val="tx1"/>
+          </a:fontRef>
+        </p:style>
+      </p:cxnSp>
     </p:spTree>
   </p:cSld>
   <p:clrMapOvr>

</xml_diff>